<commit_message>
Updated course for SP24
</commit_message>
<xml_diff>
--- a/finance/borrowing-money.pptx
+++ b/finance/borrowing-money.pptx
@@ -11476,9 +11476,6 @@
     <p:sldLayoutId id="2147483651" r:id="rId3"/>
     <p:sldLayoutId id="2147483654" r:id="rId4"/>
   </p:sldLayoutIdLst>
-  <p:transition>
-    <p:fade thruBlk="1"/>
-  </p:transition>
   <p:hf hdr="0" ftr="0" dt="0"/>
   <p:txStyles>
     <p:titleStyle>
@@ -12225,7 +12222,7 @@
             </a:pPr>
             <a:r>
               <a:rPr lang="en-US" sz="3200" dirty="0"/>
-              <a:t>9.4 Borrowing Money</a:t>
+              <a:t>6.3 Borrowing Money</a:t>
             </a:r>
             <a:endParaRPr sz="6800" dirty="0"/>
           </a:p>
@@ -12387,222 +12384,78 @@
             </p:nvSpPr>
             <p:spPr>
               <a:xfrm>
-                <a:off x="577767" y="1403131"/>
-                <a:ext cx="7621258" cy="3269415"/>
+                <a:off x="647562" y="2084437"/>
+                <a:ext cx="4671823" cy="2326403"/>
               </a:xfrm>
             </p:spPr>
             <p:txBody>
               <a:bodyPr anchor="t"/>
               <a:lstStyle/>
               <a:p>
+                <a:endParaRPr lang="en-US" sz="1800" dirty="0"/>
+              </a:p>
+              <a:p>
                 <a:r>
-                  <a:rPr lang="en-US" sz="2000" dirty="0"/>
-                  <a:t>If we want to stay within the recommended monthly mortgage payment (25% of your monthly take-home pay), we can use this formula to find the most house you can afford.</a:t>
+                  <a:rPr lang="en-US" sz="1800" dirty="0">
+                    <a:solidFill>
+                      <a:schemeClr val="dk1"/>
+                    </a:solidFill>
+                    <a:latin typeface="Roboto Condensed Light"/>
+                    <a:cs typeface="Roboto Condensed Light"/>
+                    <a:sym typeface="Roboto Condensed Light"/>
+                  </a:rPr>
+                  <a:t>When the monthly schedule is made, the interest is computed using the simple interest formula </a:t>
+                </a:r>
+                <a14:m>
+                  <m:oMath xmlns:m="http://schemas.openxmlformats.org/officeDocument/2006/math">
+                    <m:r>
+                      <a:rPr lang="en-US" sz="1800" i="1" dirty="0" smtClean="0">
+                        <a:solidFill>
+                          <a:schemeClr val="dk1"/>
+                        </a:solidFill>
+                        <a:latin typeface="Cambria Math" panose="02040503050406030204" pitchFamily="18" charset="0"/>
+                        <a:cs typeface="Roboto Condensed Light"/>
+                        <a:sym typeface="Roboto Condensed Light"/>
+                      </a:rPr>
+                      <m:t>𝐼</m:t>
+                    </m:r>
+                    <m:r>
+                      <a:rPr lang="en-US" sz="1800" i="1" dirty="0" smtClean="0">
+                        <a:solidFill>
+                          <a:schemeClr val="dk1"/>
+                        </a:solidFill>
+                        <a:latin typeface="Cambria Math" panose="02040503050406030204" pitchFamily="18" charset="0"/>
+                        <a:cs typeface="Roboto Condensed Light"/>
+                        <a:sym typeface="Roboto Condensed Light"/>
+                      </a:rPr>
+                      <m:t>=</m:t>
+                    </m:r>
+                    <m:r>
+                      <a:rPr lang="en-US" sz="1800" i="1" dirty="0" err="1" smtClean="0">
+                        <a:solidFill>
+                          <a:schemeClr val="dk1"/>
+                        </a:solidFill>
+                        <a:latin typeface="Cambria Math" panose="02040503050406030204" pitchFamily="18" charset="0"/>
+                        <a:cs typeface="Roboto Condensed Light"/>
+                        <a:sym typeface="Roboto Condensed Light"/>
+                      </a:rPr>
+                      <m:t>𝑃𝑟𝑡</m:t>
+                    </m:r>
+                  </m:oMath>
+                </a14:m>
+                <a:r>
+                  <a:rPr lang="en-US" sz="1800" dirty="0"/>
+                  <a:t>.</a:t>
                 </a:r>
               </a:p>
               <a:p>
-                <a:endParaRPr lang="en-US" b="0" i="1" dirty="0">
-                  <a:latin typeface="Cambria Math" panose="02040503050406030204" pitchFamily="18" charset="0"/>
-                </a:endParaRPr>
+                <a:endParaRPr lang="en-US" sz="1800" dirty="0"/>
               </a:p>
               <a:p>
-                <a:pPr marL="76200" indent="0">
-                  <a:buNone/>
-                </a:pPr>
-                <a14:m>
-                  <m:oMathPara xmlns:m="http://schemas.openxmlformats.org/officeDocument/2006/math">
-                    <m:oMathParaPr>
-                      <m:jc m:val="centerGroup"/>
-                    </m:oMathParaPr>
-                    <m:oMath xmlns:m="http://schemas.openxmlformats.org/officeDocument/2006/math">
-                      <m:r>
-                        <a:rPr lang="en-US" sz="2000" b="0" i="1" smtClean="0">
-                          <a:latin typeface="Cambria Math" panose="02040503050406030204" pitchFamily="18" charset="0"/>
-                        </a:rPr>
-                        <m:t>𝑀𝑎𝑥</m:t>
-                      </m:r>
-                      <m:r>
-                        <a:rPr lang="en-US" sz="2000" b="0" i="1" smtClean="0">
-                          <a:latin typeface="Cambria Math" panose="02040503050406030204" pitchFamily="18" charset="0"/>
-                        </a:rPr>
-                        <m:t> </m:t>
-                      </m:r>
-                      <m:r>
-                        <a:rPr lang="en-US" sz="2000" b="0" i="1" smtClean="0">
-                          <a:latin typeface="Cambria Math" panose="02040503050406030204" pitchFamily="18" charset="0"/>
-                        </a:rPr>
-                        <m:t>𝑃𝑢𝑟𝑐h𝑎𝑠𝑒</m:t>
-                      </m:r>
-                      <m:r>
-                        <a:rPr lang="en-US" sz="2000" b="0" i="1" smtClean="0">
-                          <a:latin typeface="Cambria Math" panose="02040503050406030204" pitchFamily="18" charset="0"/>
-                        </a:rPr>
-                        <m:t> </m:t>
-                      </m:r>
-                      <m:r>
-                        <a:rPr lang="en-US" sz="2000" b="0" i="1" smtClean="0">
-                          <a:latin typeface="Cambria Math" panose="02040503050406030204" pitchFamily="18" charset="0"/>
-                        </a:rPr>
-                        <m:t>𝑃𝑟𝑖𝑐𝑒</m:t>
-                      </m:r>
-                      <m:r>
-                        <a:rPr lang="en-US" sz="2000" b="0" i="1" smtClean="0">
-                          <a:latin typeface="Cambria Math" panose="02040503050406030204" pitchFamily="18" charset="0"/>
-                        </a:rPr>
-                        <m:t> =</m:t>
-                      </m:r>
-                      <m:r>
-                        <a:rPr lang="en-US" sz="2000" b="0" i="1" smtClean="0">
-                          <a:latin typeface="Cambria Math" panose="02040503050406030204" pitchFamily="18" charset="0"/>
-                        </a:rPr>
-                        <m:t>𝑃𝑀𝑇</m:t>
-                      </m:r>
-                      <m:r>
-                        <a:rPr lang="en-US" sz="2000" b="0" i="1" smtClean="0">
-                          <a:latin typeface="Cambria Math" panose="02040503050406030204" pitchFamily="18" charset="0"/>
-                          <a:ea typeface="Cambria Math" panose="02040503050406030204" pitchFamily="18" charset="0"/>
-                        </a:rPr>
-                        <m:t>∙</m:t>
-                      </m:r>
-                      <m:f>
-                        <m:fPr>
-                          <m:ctrlPr>
-                            <a:rPr lang="en-US" sz="2000" b="0" i="1" smtClean="0">
-                              <a:latin typeface="Cambria Math" panose="02040503050406030204" pitchFamily="18" charset="0"/>
-                            </a:rPr>
-                          </m:ctrlPr>
-                        </m:fPr>
-                        <m:num>
-                          <m:d>
-                            <m:dPr>
-                              <m:begChr m:val="["/>
-                              <m:endChr m:val="]"/>
-                              <m:ctrlPr>
-                                <a:rPr lang="en-US" sz="2000" i="1">
-                                  <a:latin typeface="Cambria Math" panose="02040503050406030204" pitchFamily="18" charset="0"/>
-                                </a:rPr>
-                              </m:ctrlPr>
-                            </m:dPr>
-                            <m:e>
-                              <m:r>
-                                <a:rPr lang="en-US" sz="2000" i="1">
-                                  <a:latin typeface="Cambria Math" panose="02040503050406030204" pitchFamily="18" charset="0"/>
-                                </a:rPr>
-                                <m:t>1−</m:t>
-                              </m:r>
-                              <m:sSup>
-                                <m:sSupPr>
-                                  <m:ctrlPr>
-                                    <a:rPr lang="en-US" sz="2000" i="1">
-                                      <a:latin typeface="Cambria Math" panose="02040503050406030204" pitchFamily="18" charset="0"/>
-                                    </a:rPr>
-                                  </m:ctrlPr>
-                                </m:sSupPr>
-                                <m:e>
-                                  <m:d>
-                                    <m:dPr>
-                                      <m:ctrlPr>
-                                        <a:rPr lang="en-US" sz="2000" i="1">
-                                          <a:latin typeface="Cambria Math" panose="02040503050406030204" pitchFamily="18" charset="0"/>
-                                        </a:rPr>
-                                      </m:ctrlPr>
-                                    </m:dPr>
-                                    <m:e>
-                                      <m:r>
-                                        <a:rPr lang="en-US" sz="2000" i="1">
-                                          <a:latin typeface="Cambria Math" panose="02040503050406030204" pitchFamily="18" charset="0"/>
-                                        </a:rPr>
-                                        <m:t>1+</m:t>
-                                      </m:r>
-                                      <m:f>
-                                        <m:fPr>
-                                          <m:ctrlPr>
-                                            <a:rPr lang="en-US" sz="2000" i="1">
-                                              <a:latin typeface="Cambria Math" panose="02040503050406030204" pitchFamily="18" charset="0"/>
-                                            </a:rPr>
-                                          </m:ctrlPr>
-                                        </m:fPr>
-                                        <m:num>
-                                          <m:r>
-                                            <a:rPr lang="en-US" sz="2000" i="1">
-                                              <a:latin typeface="Cambria Math" panose="02040503050406030204" pitchFamily="18" charset="0"/>
-                                            </a:rPr>
-                                            <m:t>𝑟</m:t>
-                                          </m:r>
-                                        </m:num>
-                                        <m:den>
-                                          <m:r>
-                                            <a:rPr lang="en-US" sz="2000" i="1">
-                                              <a:latin typeface="Cambria Math" panose="02040503050406030204" pitchFamily="18" charset="0"/>
-                                            </a:rPr>
-                                            <m:t>𝑛</m:t>
-                                          </m:r>
-                                        </m:den>
-                                      </m:f>
-                                    </m:e>
-                                  </m:d>
-                                </m:e>
-                                <m:sup>
-                                  <m:r>
-                                    <a:rPr lang="en-US" sz="2000" i="1">
-                                      <a:latin typeface="Cambria Math" panose="02040503050406030204" pitchFamily="18" charset="0"/>
-                                    </a:rPr>
-                                    <m:t>−</m:t>
-                                  </m:r>
-                                  <m:r>
-                                    <a:rPr lang="en-US" sz="2000" i="1">
-                                      <a:latin typeface="Cambria Math" panose="02040503050406030204" pitchFamily="18" charset="0"/>
-                                    </a:rPr>
-                                    <m:t>𝑛𝑡</m:t>
-                                  </m:r>
-                                </m:sup>
-                              </m:sSup>
-                            </m:e>
-                          </m:d>
-                        </m:num>
-                        <m:den>
-                          <m:d>
-                            <m:dPr>
-                              <m:ctrlPr>
-                                <a:rPr lang="en-US" sz="2000" b="0" i="1" smtClean="0">
-                                  <a:latin typeface="Cambria Math" panose="02040503050406030204" pitchFamily="18" charset="0"/>
-                                </a:rPr>
-                              </m:ctrlPr>
-                            </m:dPr>
-                            <m:e>
-                              <m:f>
-                                <m:fPr>
-                                  <m:ctrlPr>
-                                    <a:rPr lang="en-US" sz="2000" b="0" i="1" smtClean="0">
-                                      <a:latin typeface="Cambria Math" panose="02040503050406030204" pitchFamily="18" charset="0"/>
-                                    </a:rPr>
-                                  </m:ctrlPr>
-                                </m:fPr>
-                                <m:num>
-                                  <m:r>
-                                    <a:rPr lang="en-US" sz="2000" b="0" i="1" smtClean="0">
-                                      <a:latin typeface="Cambria Math" panose="02040503050406030204" pitchFamily="18" charset="0"/>
-                                    </a:rPr>
-                                    <m:t>𝑟</m:t>
-                                  </m:r>
-                                </m:num>
-                                <m:den>
-                                  <m:r>
-                                    <a:rPr lang="en-US" sz="2000" b="0" i="1" smtClean="0">
-                                      <a:latin typeface="Cambria Math" panose="02040503050406030204" pitchFamily="18" charset="0"/>
-                                    </a:rPr>
-                                    <m:t>𝑛</m:t>
-                                  </m:r>
-                                </m:den>
-                              </m:f>
-                            </m:e>
-                          </m:d>
-                        </m:den>
-                      </m:f>
-                    </m:oMath>
-                  </m:oMathPara>
-                </a14:m>
-                <a:endParaRPr lang="en-US" sz="1800" dirty="0"/>
+                <a:endParaRPr lang="en-US" sz="1800" b="1" dirty="0"/>
+              </a:p>
+              <a:p>
+                <a:endParaRPr lang="en-US" sz="1800" b="1" dirty="0"/>
               </a:p>
             </p:txBody>
           </p:sp>
@@ -12626,13 +12479,13 @@
             </p:nvSpPr>
             <p:spPr>
               <a:xfrm>
-                <a:off x="577767" y="1403131"/>
-                <a:ext cx="7621258" cy="3269415"/>
+                <a:off x="647562" y="2084437"/>
+                <a:ext cx="4671823" cy="2326403"/>
               </a:xfrm>
               <a:blipFill>
                 <a:blip r:embed="rId3"/>
                 <a:stretch>
-                  <a:fillRect l="-499" t="-775"/>
+                  <a:fillRect l="-541"/>
                 </a:stretch>
               </a:blipFill>
             </p:spPr>
@@ -13259,37 +13112,6 @@
           </p:txBody>
         </p:sp>
       </p:grpSp>
-      <p:pic>
-        <p:nvPicPr>
-          <p:cNvPr id="20" name="Picture 19">
-            <a:extLst>
-              <a:ext uri="{FF2B5EF4-FFF2-40B4-BE49-F238E27FC236}">
-                <a16:creationId xmlns:a16="http://schemas.microsoft.com/office/drawing/2014/main" id="{A579138C-E523-F741-879F-987976DF54CF}"/>
-              </a:ext>
-            </a:extLst>
-          </p:cNvPr>
-          <p:cNvPicPr>
-            <a:picLocks noChangeAspect="1"/>
-          </p:cNvPicPr>
-          <p:nvPr/>
-        </p:nvPicPr>
-        <p:blipFill rotWithShape="1">
-          <a:blip r:embed="rId4">
-            <a:lum bright="70000" contrast="-70000"/>
-          </a:blip>
-          <a:srcRect t="20698" b="25074"/>
-          <a:stretch/>
-        </p:blipFill>
-        <p:spPr>
-          <a:xfrm>
-            <a:off x="440377" y="3761856"/>
-            <a:ext cx="1257300" cy="874644"/>
-          </a:xfrm>
-          <a:prstGeom prst="rect">
-            <a:avLst/>
-          </a:prstGeom>
-        </p:spPr>
-      </p:pic>
       <p:grpSp>
         <p:nvGrpSpPr>
           <p:cNvPr id="24" name="Group 23">
@@ -13611,6 +13433,742 @@
           </p:txBody>
         </p:sp>
       </p:grpSp>
+      <p:sp>
+        <p:nvSpPr>
+          <p:cNvPr id="11" name="Text Placeholder 1">
+            <a:extLst>
+              <a:ext uri="{FF2B5EF4-FFF2-40B4-BE49-F238E27FC236}">
+                <a16:creationId xmlns:a16="http://schemas.microsoft.com/office/drawing/2014/main" id="{3122AB8E-A471-461C-EE5D-7FD72A899560}"/>
+              </a:ext>
+            </a:extLst>
+          </p:cNvPr>
+          <p:cNvSpPr txBox="1">
+            <a:spLocks/>
+          </p:cNvSpPr>
+          <p:nvPr/>
+        </p:nvSpPr>
+        <p:spPr>
+          <a:xfrm>
+            <a:off x="621868" y="1095319"/>
+            <a:ext cx="8023424" cy="1324052"/>
+          </a:xfrm>
+          <a:prstGeom prst="rect">
+            <a:avLst/>
+          </a:prstGeom>
+          <a:noFill/>
+          <a:ln>
+            <a:noFill/>
+          </a:ln>
+        </p:spPr>
+        <p:txBody>
+          <a:bodyPr spcFirstLastPara="1" wrap="square" lIns="91425" tIns="91425" rIns="91425" bIns="91425" anchor="t" anchorCtr="0">
+            <a:noAutofit/>
+          </a:bodyPr>
+          <a:lstStyle>
+            <a:defPPr marR="0" lvl="0" algn="l" rtl="0">
+              <a:lnSpc>
+                <a:spcPct val="100000"/>
+              </a:lnSpc>
+              <a:spcBef>
+                <a:spcPts val="0"/>
+              </a:spcBef>
+              <a:spcAft>
+                <a:spcPts val="0"/>
+              </a:spcAft>
+            </a:defPPr>
+            <a:lvl1pPr marL="457200" marR="0" lvl="0" indent="-381000" algn="l" rtl="0">
+              <a:lnSpc>
+                <a:spcPct val="100000"/>
+              </a:lnSpc>
+              <a:spcBef>
+                <a:spcPts val="600"/>
+              </a:spcBef>
+              <a:spcAft>
+                <a:spcPts val="0"/>
+              </a:spcAft>
+              <a:buClr>
+                <a:schemeClr val="accent4"/>
+              </a:buClr>
+              <a:buSzPts val="2400"/>
+              <a:buFont typeface="Roboto Condensed Light"/>
+              <a:buChar char="▰"/>
+              <a:defRPr sz="2400" b="0" i="0" u="none" strike="noStrike" cap="none">
+                <a:solidFill>
+                  <a:schemeClr val="dk1"/>
+                </a:solidFill>
+                <a:latin typeface="Roboto Condensed Light"/>
+                <a:ea typeface="Roboto Condensed Light"/>
+                <a:cs typeface="Roboto Condensed Light"/>
+                <a:sym typeface="Roboto Condensed Light"/>
+              </a:defRPr>
+            </a:lvl1pPr>
+            <a:lvl2pPr marL="914400" marR="0" lvl="1" indent="-381000" algn="l" rtl="0">
+              <a:lnSpc>
+                <a:spcPct val="100000"/>
+              </a:lnSpc>
+              <a:spcBef>
+                <a:spcPts val="1000"/>
+              </a:spcBef>
+              <a:spcAft>
+                <a:spcPts val="0"/>
+              </a:spcAft>
+              <a:buClr>
+                <a:schemeClr val="accent4"/>
+              </a:buClr>
+              <a:buSzPts val="2400"/>
+              <a:buFont typeface="Roboto Condensed Light"/>
+              <a:buChar char="▻"/>
+              <a:defRPr sz="2400" b="0" i="0" u="none" strike="noStrike" cap="none">
+                <a:solidFill>
+                  <a:schemeClr val="dk1"/>
+                </a:solidFill>
+                <a:latin typeface="Roboto Condensed Light"/>
+                <a:ea typeface="Roboto Condensed Light"/>
+                <a:cs typeface="Roboto Condensed Light"/>
+                <a:sym typeface="Roboto Condensed Light"/>
+              </a:defRPr>
+            </a:lvl2pPr>
+            <a:lvl3pPr marL="1371600" marR="0" lvl="2" indent="-381000" algn="l" rtl="0">
+              <a:lnSpc>
+                <a:spcPct val="100000"/>
+              </a:lnSpc>
+              <a:spcBef>
+                <a:spcPts val="1000"/>
+              </a:spcBef>
+              <a:spcAft>
+                <a:spcPts val="0"/>
+              </a:spcAft>
+              <a:buClr>
+                <a:schemeClr val="accent4"/>
+              </a:buClr>
+              <a:buSzPts val="2400"/>
+              <a:buFont typeface="Roboto Condensed Light"/>
+              <a:buChar char="▻"/>
+              <a:defRPr sz="2400" b="0" i="0" u="none" strike="noStrike" cap="none">
+                <a:solidFill>
+                  <a:schemeClr val="dk1"/>
+                </a:solidFill>
+                <a:latin typeface="Roboto Condensed Light"/>
+                <a:ea typeface="Roboto Condensed Light"/>
+                <a:cs typeface="Roboto Condensed Light"/>
+                <a:sym typeface="Roboto Condensed Light"/>
+              </a:defRPr>
+            </a:lvl3pPr>
+            <a:lvl4pPr marL="1828800" marR="0" lvl="3" indent="-381000" algn="l" rtl="0">
+              <a:lnSpc>
+                <a:spcPct val="100000"/>
+              </a:lnSpc>
+              <a:spcBef>
+                <a:spcPts val="1000"/>
+              </a:spcBef>
+              <a:spcAft>
+                <a:spcPts val="0"/>
+              </a:spcAft>
+              <a:buClr>
+                <a:schemeClr val="accent4"/>
+              </a:buClr>
+              <a:buSzPts val="2400"/>
+              <a:buFont typeface="Roboto Condensed Light"/>
+              <a:buChar char="▻"/>
+              <a:defRPr sz="2400" b="0" i="0" u="none" strike="noStrike" cap="none">
+                <a:solidFill>
+                  <a:schemeClr val="dk1"/>
+                </a:solidFill>
+                <a:latin typeface="Roboto Condensed Light"/>
+                <a:ea typeface="Roboto Condensed Light"/>
+                <a:cs typeface="Roboto Condensed Light"/>
+                <a:sym typeface="Roboto Condensed Light"/>
+              </a:defRPr>
+            </a:lvl4pPr>
+            <a:lvl5pPr marL="2286000" marR="0" lvl="4" indent="-381000" algn="l" rtl="0">
+              <a:lnSpc>
+                <a:spcPct val="100000"/>
+              </a:lnSpc>
+              <a:spcBef>
+                <a:spcPts val="1000"/>
+              </a:spcBef>
+              <a:spcAft>
+                <a:spcPts val="0"/>
+              </a:spcAft>
+              <a:buClr>
+                <a:schemeClr val="accent4"/>
+              </a:buClr>
+              <a:buSzPts val="2400"/>
+              <a:buFont typeface="Roboto Condensed Light"/>
+              <a:buChar char="▻"/>
+              <a:defRPr sz="2400" b="0" i="0" u="none" strike="noStrike" cap="none">
+                <a:solidFill>
+                  <a:schemeClr val="dk1"/>
+                </a:solidFill>
+                <a:latin typeface="Roboto Condensed Light"/>
+                <a:ea typeface="Roboto Condensed Light"/>
+                <a:cs typeface="Roboto Condensed Light"/>
+                <a:sym typeface="Roboto Condensed Light"/>
+              </a:defRPr>
+            </a:lvl5pPr>
+            <a:lvl6pPr marL="2743200" marR="0" lvl="5" indent="-381000" algn="l" rtl="0">
+              <a:lnSpc>
+                <a:spcPct val="100000"/>
+              </a:lnSpc>
+              <a:spcBef>
+                <a:spcPts val="1000"/>
+              </a:spcBef>
+              <a:spcAft>
+                <a:spcPts val="0"/>
+              </a:spcAft>
+              <a:buClr>
+                <a:schemeClr val="accent4"/>
+              </a:buClr>
+              <a:buSzPts val="2400"/>
+              <a:buFont typeface="Roboto Condensed Light"/>
+              <a:buChar char="▻"/>
+              <a:defRPr sz="2400" b="0" i="0" u="none" strike="noStrike" cap="none">
+                <a:solidFill>
+                  <a:schemeClr val="dk1"/>
+                </a:solidFill>
+                <a:latin typeface="Roboto Condensed Light"/>
+                <a:ea typeface="Roboto Condensed Light"/>
+                <a:cs typeface="Roboto Condensed Light"/>
+                <a:sym typeface="Roboto Condensed Light"/>
+              </a:defRPr>
+            </a:lvl6pPr>
+            <a:lvl7pPr marL="3200400" marR="0" lvl="6" indent="-381000" algn="l" rtl="0">
+              <a:lnSpc>
+                <a:spcPct val="100000"/>
+              </a:lnSpc>
+              <a:spcBef>
+                <a:spcPts val="1000"/>
+              </a:spcBef>
+              <a:spcAft>
+                <a:spcPts val="0"/>
+              </a:spcAft>
+              <a:buClr>
+                <a:schemeClr val="accent4"/>
+              </a:buClr>
+              <a:buSzPts val="2400"/>
+              <a:buFont typeface="Roboto Condensed Light"/>
+              <a:buChar char="▻"/>
+              <a:defRPr sz="2400" b="0" i="0" u="none" strike="noStrike" cap="none">
+                <a:solidFill>
+                  <a:schemeClr val="dk1"/>
+                </a:solidFill>
+                <a:latin typeface="Roboto Condensed Light"/>
+                <a:ea typeface="Roboto Condensed Light"/>
+                <a:cs typeface="Roboto Condensed Light"/>
+                <a:sym typeface="Roboto Condensed Light"/>
+              </a:defRPr>
+            </a:lvl7pPr>
+            <a:lvl8pPr marL="3657600" marR="0" lvl="7" indent="-381000" algn="l" rtl="0">
+              <a:lnSpc>
+                <a:spcPct val="100000"/>
+              </a:lnSpc>
+              <a:spcBef>
+                <a:spcPts val="1000"/>
+              </a:spcBef>
+              <a:spcAft>
+                <a:spcPts val="0"/>
+              </a:spcAft>
+              <a:buClr>
+                <a:schemeClr val="accent4"/>
+              </a:buClr>
+              <a:buSzPts val="2400"/>
+              <a:buFont typeface="Roboto Condensed Light"/>
+              <a:buChar char="▻"/>
+              <a:defRPr sz="2400" b="0" i="0" u="none" strike="noStrike" cap="none">
+                <a:solidFill>
+                  <a:schemeClr val="dk1"/>
+                </a:solidFill>
+                <a:latin typeface="Roboto Condensed Light"/>
+                <a:ea typeface="Roboto Condensed Light"/>
+                <a:cs typeface="Roboto Condensed Light"/>
+                <a:sym typeface="Roboto Condensed Light"/>
+              </a:defRPr>
+            </a:lvl8pPr>
+            <a:lvl9pPr marL="4114800" marR="0" lvl="8" indent="-381000" algn="l" rtl="0">
+              <a:lnSpc>
+                <a:spcPct val="100000"/>
+              </a:lnSpc>
+              <a:spcBef>
+                <a:spcPts val="1000"/>
+              </a:spcBef>
+              <a:spcAft>
+                <a:spcPts val="1000"/>
+              </a:spcAft>
+              <a:buClr>
+                <a:schemeClr val="accent4"/>
+              </a:buClr>
+              <a:buSzPts val="2400"/>
+              <a:buFont typeface="Roboto Condensed Light"/>
+              <a:buChar char="▻"/>
+              <a:defRPr sz="2400" b="0" i="0" u="none" strike="noStrike" cap="none">
+                <a:solidFill>
+                  <a:schemeClr val="dk1"/>
+                </a:solidFill>
+                <a:latin typeface="Roboto Condensed Light"/>
+                <a:ea typeface="Roboto Condensed Light"/>
+                <a:cs typeface="Roboto Condensed Light"/>
+                <a:sym typeface="Roboto Condensed Light"/>
+              </a:defRPr>
+            </a:lvl9pPr>
+          </a:lstStyle>
+          <a:p>
+            <a:endParaRPr lang="en-US" sz="1800" dirty="0"/>
+          </a:p>
+          <a:p>
+            <a:r>
+              <a:rPr lang="en-US" sz="1800" b="1" dirty="0"/>
+              <a:t>Amortization schedule</a:t>
+            </a:r>
+            <a:r>
+              <a:rPr lang="en-US" sz="1800" dirty="0"/>
+              <a:t>: Payments on loans such as mortgages are portioned out between interest and principal. To show you this breakdown over time, lenders provide loan amortization schedules.</a:t>
+            </a:r>
+          </a:p>
+          <a:p>
+            <a:endParaRPr lang="en-US" sz="1800" dirty="0"/>
+          </a:p>
+          <a:p>
+            <a:endParaRPr lang="en-US" sz="1800" dirty="0"/>
+          </a:p>
+          <a:p>
+            <a:endParaRPr lang="en-US" sz="1800" b="1" dirty="0"/>
+          </a:p>
+        </p:txBody>
+      </p:sp>
+      <p:grpSp>
+        <p:nvGrpSpPr>
+          <p:cNvPr id="15" name="Group 14">
+            <a:extLst>
+              <a:ext uri="{FF2B5EF4-FFF2-40B4-BE49-F238E27FC236}">
+                <a16:creationId xmlns:a16="http://schemas.microsoft.com/office/drawing/2014/main" id="{D05558A2-F7F5-FA4E-4E4A-D5BAC1EC417C}"/>
+              </a:ext>
+            </a:extLst>
+          </p:cNvPr>
+          <p:cNvGrpSpPr/>
+          <p:nvPr/>
+        </p:nvGrpSpPr>
+        <p:grpSpPr>
+          <a:xfrm>
+            <a:off x="5353397" y="2310097"/>
+            <a:ext cx="3481682" cy="2139269"/>
+            <a:chOff x="5170531" y="2246964"/>
+            <a:chExt cx="3481682" cy="2139269"/>
+          </a:xfrm>
+        </p:grpSpPr>
+        <p:pic>
+          <p:nvPicPr>
+            <p:cNvPr id="4" name="Picture 3">
+              <a:extLst>
+                <a:ext uri="{FF2B5EF4-FFF2-40B4-BE49-F238E27FC236}">
+                  <a16:creationId xmlns:a16="http://schemas.microsoft.com/office/drawing/2014/main" id="{B94DF933-60D2-6FCB-DA22-AF5972744CEF}"/>
+                </a:ext>
+              </a:extLst>
+            </p:cNvPr>
+            <p:cNvPicPr>
+              <a:picLocks noChangeAspect="1"/>
+            </p:cNvPicPr>
+            <p:nvPr/>
+          </p:nvPicPr>
+          <p:blipFill>
+            <a:blip r:embed="rId4"/>
+            <a:stretch>
+              <a:fillRect/>
+            </a:stretch>
+          </p:blipFill>
+          <p:spPr>
+            <a:xfrm>
+              <a:off x="5170531" y="2475152"/>
+              <a:ext cx="3481682" cy="1911081"/>
+            </a:xfrm>
+            <a:prstGeom prst="rect">
+              <a:avLst/>
+            </a:prstGeom>
+          </p:spPr>
+        </p:pic>
+        <p:sp>
+          <p:nvSpPr>
+            <p:cNvPr id="14" name="TextBox 13">
+              <a:extLst>
+                <a:ext uri="{FF2B5EF4-FFF2-40B4-BE49-F238E27FC236}">
+                  <a16:creationId xmlns:a16="http://schemas.microsoft.com/office/drawing/2014/main" id="{2798A3D2-20E8-9299-3B84-46E7B12678DD}"/>
+                </a:ext>
+              </a:extLst>
+            </p:cNvPr>
+            <p:cNvSpPr txBox="1"/>
+            <p:nvPr/>
+          </p:nvSpPr>
+          <p:spPr>
+            <a:xfrm>
+              <a:off x="5803818" y="2246964"/>
+              <a:ext cx="2395207" cy="276999"/>
+            </a:xfrm>
+            <a:prstGeom prst="rect">
+              <a:avLst/>
+            </a:prstGeom>
+            <a:noFill/>
+          </p:spPr>
+          <p:txBody>
+            <a:bodyPr wrap="none" rtlCol="0">
+              <a:spAutoFit/>
+            </a:bodyPr>
+            <a:lstStyle/>
+            <a:p>
+              <a:r>
+                <a:rPr lang="en-US" sz="1200" dirty="0">
+                  <a:solidFill>
+                    <a:schemeClr val="dk1"/>
+                  </a:solidFill>
+                  <a:latin typeface="Roboto Condensed Light"/>
+                  <a:cs typeface="Roboto Condensed Light"/>
+                  <a:sym typeface="Roboto Condensed Light"/>
+                </a:rPr>
+                <a:t>Loan amount: $190,000 @ 3.5% APR</a:t>
+              </a:r>
+              <a:endParaRPr lang="en-US" sz="1050" dirty="0"/>
+            </a:p>
+          </p:txBody>
+        </p:sp>
+      </p:grpSp>
+      <p:sp>
+        <p:nvSpPr>
+          <p:cNvPr id="12" name="Rectangle 11">
+            <a:extLst>
+              <a:ext uri="{FF2B5EF4-FFF2-40B4-BE49-F238E27FC236}">
+                <a16:creationId xmlns:a16="http://schemas.microsoft.com/office/drawing/2014/main" id="{60139574-9F29-1623-070A-31FA35908A50}"/>
+              </a:ext>
+            </a:extLst>
+          </p:cNvPr>
+          <p:cNvSpPr/>
+          <p:nvPr/>
+        </p:nvSpPr>
+        <p:spPr>
+          <a:xfrm>
+            <a:off x="5772573" y="2889688"/>
+            <a:ext cx="2948588" cy="237893"/>
+          </a:xfrm>
+          <a:prstGeom prst="rect">
+            <a:avLst/>
+          </a:prstGeom>
+          <a:noFill/>
+        </p:spPr>
+        <p:style>
+          <a:lnRef idx="2">
+            <a:schemeClr val="accent1">
+              <a:shade val="15000"/>
+            </a:schemeClr>
+          </a:lnRef>
+          <a:fillRef idx="1">
+            <a:schemeClr val="accent1"/>
+          </a:fillRef>
+          <a:effectRef idx="0">
+            <a:schemeClr val="accent1"/>
+          </a:effectRef>
+          <a:fontRef idx="minor">
+            <a:schemeClr val="lt1"/>
+          </a:fontRef>
+        </p:style>
+        <p:txBody>
+          <a:bodyPr rtlCol="0" anchor="ctr"/>
+          <a:lstStyle/>
+          <a:p>
+            <a:pPr algn="ctr"/>
+            <a:endParaRPr lang="en-US"/>
+          </a:p>
+        </p:txBody>
+      </p:sp>
+      <mc:AlternateContent xmlns:mc="http://schemas.openxmlformats.org/markup-compatibility/2006" xmlns:a14="http://schemas.microsoft.com/office/drawing/2010/main">
+        <mc:Choice Requires="a14">
+          <p:sp>
+            <p:nvSpPr>
+              <p:cNvPr id="16" name="TextBox 15">
+                <a:extLst>
+                  <a:ext uri="{FF2B5EF4-FFF2-40B4-BE49-F238E27FC236}">
+                    <a16:creationId xmlns:a16="http://schemas.microsoft.com/office/drawing/2014/main" id="{7A2AF196-05CA-CD50-4396-BFC5D8281267}"/>
+                  </a:ext>
+                </a:extLst>
+              </p:cNvPr>
+              <p:cNvSpPr txBox="1"/>
+              <p:nvPr/>
+            </p:nvSpPr>
+            <p:spPr>
+              <a:xfrm>
+                <a:off x="1115123" y="3552532"/>
+                <a:ext cx="3039230" cy="711092"/>
+              </a:xfrm>
+              <a:prstGeom prst="rect">
+                <a:avLst/>
+              </a:prstGeom>
+              <a:noFill/>
+            </p:spPr>
+            <p:txBody>
+              <a:bodyPr wrap="none" rtlCol="0">
+                <a:spAutoFit/>
+              </a:bodyPr>
+              <a:lstStyle/>
+              <a:p>
+                <a:pPr/>
+                <a14:m>
+                  <m:oMathPara xmlns:m="http://schemas.openxmlformats.org/officeDocument/2006/math">
+                    <m:oMathParaPr>
+                      <m:jc m:val="centerGroup"/>
+                    </m:oMathParaPr>
+                    <m:oMath xmlns:m="http://schemas.openxmlformats.org/officeDocument/2006/math">
+                      <m:r>
+                        <a:rPr lang="en-US" b="0" i="1" smtClean="0">
+                          <a:latin typeface="Cambria Math" panose="02040503050406030204" pitchFamily="18" charset="0"/>
+                        </a:rPr>
+                        <m:t>𝐼</m:t>
+                      </m:r>
+                      <m:r>
+                        <a:rPr lang="en-US" b="0" i="1" smtClean="0">
+                          <a:latin typeface="Cambria Math" panose="02040503050406030204" pitchFamily="18" charset="0"/>
+                        </a:rPr>
+                        <m:t>=190,000∗0.035∗</m:t>
+                      </m:r>
+                      <m:f>
+                        <m:fPr>
+                          <m:ctrlPr>
+                            <a:rPr lang="en-US" b="0" i="1" smtClean="0">
+                              <a:latin typeface="Cambria Math" panose="02040503050406030204" pitchFamily="18" charset="0"/>
+                            </a:rPr>
+                          </m:ctrlPr>
+                        </m:fPr>
+                        <m:num>
+                          <m:r>
+                            <a:rPr lang="en-US" b="0" i="1" smtClean="0">
+                              <a:latin typeface="Cambria Math" panose="02040503050406030204" pitchFamily="18" charset="0"/>
+                            </a:rPr>
+                            <m:t>1</m:t>
+                          </m:r>
+                        </m:num>
+                        <m:den>
+                          <m:r>
+                            <a:rPr lang="en-US" b="0" i="1" smtClean="0">
+                              <a:latin typeface="Cambria Math" panose="02040503050406030204" pitchFamily="18" charset="0"/>
+                            </a:rPr>
+                            <m:t>12</m:t>
+                          </m:r>
+                        </m:den>
+                      </m:f>
+                      <m:r>
+                        <a:rPr lang="en-US" i="1">
+                          <a:latin typeface="Cambria Math" panose="02040503050406030204" pitchFamily="18" charset="0"/>
+                        </a:rPr>
+                        <m:t>=$554.17</m:t>
+                      </m:r>
+                    </m:oMath>
+                  </m:oMathPara>
+                </a14:m>
+                <a:endParaRPr lang="en-US" dirty="0"/>
+              </a:p>
+              <a:p>
+                <a:endParaRPr lang="en-US" dirty="0"/>
+              </a:p>
+            </p:txBody>
+          </p:sp>
+        </mc:Choice>
+        <mc:Fallback xmlns="">
+          <p:sp>
+            <p:nvSpPr>
+              <p:cNvPr id="16" name="TextBox 15">
+                <a:extLst>
+                  <a:ext uri="{FF2B5EF4-FFF2-40B4-BE49-F238E27FC236}">
+                    <a16:creationId xmlns:a16="http://schemas.microsoft.com/office/drawing/2014/main" id="{7A2AF196-05CA-CD50-4396-BFC5D8281267}"/>
+                  </a:ext>
+                </a:extLst>
+              </p:cNvPr>
+              <p:cNvSpPr txBox="1">
+                <a:spLocks noRot="1" noChangeAspect="1" noMove="1" noResize="1" noEditPoints="1" noAdjustHandles="1" noChangeArrowheads="1" noChangeShapeType="1" noTextEdit="1"/>
+              </p:cNvSpPr>
+              <p:nvPr/>
+            </p:nvSpPr>
+            <p:spPr>
+              <a:xfrm>
+                <a:off x="1115123" y="3552532"/>
+                <a:ext cx="3039230" cy="711092"/>
+              </a:xfrm>
+              <a:prstGeom prst="rect">
+                <a:avLst/>
+              </a:prstGeom>
+              <a:blipFill>
+                <a:blip r:embed="rId5"/>
+                <a:stretch>
+                  <a:fillRect/>
+                </a:stretch>
+              </a:blipFill>
+            </p:spPr>
+            <p:txBody>
+              <a:bodyPr/>
+              <a:lstStyle/>
+              <a:p>
+                <a:r>
+                  <a:rPr lang="en-US">
+                    <a:noFill/>
+                  </a:rPr>
+                  <a:t> </a:t>
+                </a:r>
+              </a:p>
+            </p:txBody>
+          </p:sp>
+        </mc:Fallback>
+      </mc:AlternateContent>
+      <mc:AlternateContent xmlns:mc="http://schemas.openxmlformats.org/markup-compatibility/2006" xmlns:a14="http://schemas.microsoft.com/office/drawing/2010/main">
+        <mc:Choice Requires="a14">
+          <p:sp>
+            <p:nvSpPr>
+              <p:cNvPr id="18" name="TextBox 17">
+                <a:extLst>
+                  <a:ext uri="{FF2B5EF4-FFF2-40B4-BE49-F238E27FC236}">
+                    <a16:creationId xmlns:a16="http://schemas.microsoft.com/office/drawing/2014/main" id="{C3C55055-6FEC-B7C1-C8AF-8632579CBD6F}"/>
+                  </a:ext>
+                </a:extLst>
+              </p:cNvPr>
+              <p:cNvSpPr txBox="1"/>
+              <p:nvPr/>
+            </p:nvSpPr>
+            <p:spPr>
+              <a:xfrm>
+                <a:off x="577767" y="4067103"/>
+                <a:ext cx="3366627" cy="954107"/>
+              </a:xfrm>
+              <a:prstGeom prst="rect">
+                <a:avLst/>
+              </a:prstGeom>
+              <a:noFill/>
+            </p:spPr>
+            <p:txBody>
+              <a:bodyPr wrap="none" rtlCol="0">
+                <a:spAutoFit/>
+              </a:bodyPr>
+              <a:lstStyle/>
+              <a:p>
+                <a:r>
+                  <a:rPr lang="en-US" b="0" dirty="0"/>
+                  <a:t>           </a:t>
+                </a:r>
+                <a14:m>
+                  <m:oMath xmlns:m="http://schemas.openxmlformats.org/officeDocument/2006/math">
+                    <m:r>
+                      <a:rPr lang="en-US" b="0" i="1" smtClean="0">
+                        <a:latin typeface="Cambria Math" panose="02040503050406030204" pitchFamily="18" charset="0"/>
+                      </a:rPr>
+                      <m:t>𝑃𝑟𝑖𝑛𝑐𝑖𝑝𝑎𝑙</m:t>
+                    </m:r>
+                    <m:r>
+                      <a:rPr lang="en-US" b="0" i="1" smtClean="0">
+                        <a:latin typeface="Cambria Math" panose="02040503050406030204" pitchFamily="18" charset="0"/>
+                      </a:rPr>
+                      <m:t>=</m:t>
+                    </m:r>
+                    <m:r>
+                      <a:rPr lang="en-US" b="0" i="1" smtClean="0">
+                        <a:latin typeface="Cambria Math" panose="02040503050406030204" pitchFamily="18" charset="0"/>
+                      </a:rPr>
+                      <m:t>𝑃𝑎𝑦𝑚𝑒𝑛𝑡</m:t>
+                    </m:r>
+                    <m:r>
+                      <a:rPr lang="en-US" b="0" i="1" smtClean="0">
+                        <a:latin typeface="Cambria Math" panose="02040503050406030204" pitchFamily="18" charset="0"/>
+                      </a:rPr>
+                      <m:t> −</m:t>
+                    </m:r>
+                    <m:r>
+                      <a:rPr lang="en-US" b="0" i="1" smtClean="0">
+                        <a:latin typeface="Cambria Math" panose="02040503050406030204" pitchFamily="18" charset="0"/>
+                      </a:rPr>
+                      <m:t>𝐼𝑛𝑡𝑒𝑟𝑒𝑠𝑡</m:t>
+                    </m:r>
+                  </m:oMath>
+                </a14:m>
+                <a:endParaRPr lang="en-US" b="0" dirty="0"/>
+              </a:p>
+              <a:p>
+                <a:r>
+                  <a:rPr lang="en-US" b="0" dirty="0"/>
+                  <a:t>                           </a:t>
+                </a:r>
+                <a14:m>
+                  <m:oMath xmlns:m="http://schemas.openxmlformats.org/officeDocument/2006/math">
+                    <m:r>
+                      <a:rPr lang="en-US" b="0" i="1" smtClean="0">
+                        <a:latin typeface="Cambria Math" panose="02040503050406030204" pitchFamily="18" charset="0"/>
+                      </a:rPr>
+                      <m:t>= 853.18−554.1</m:t>
+                    </m:r>
+                  </m:oMath>
+                </a14:m>
+                <a:endParaRPr lang="en-US" b="0" i="1" dirty="0">
+                  <a:latin typeface="Cambria Math" panose="02040503050406030204" pitchFamily="18" charset="0"/>
+                </a:endParaRPr>
+              </a:p>
+              <a:p>
+                <a:r>
+                  <a:rPr lang="en-US" b="0" dirty="0"/>
+                  <a:t>                           </a:t>
+                </a:r>
+                <a14:m>
+                  <m:oMath xmlns:m="http://schemas.openxmlformats.org/officeDocument/2006/math">
+                    <m:r>
+                      <a:rPr lang="en-US" b="0" i="1" smtClean="0">
+                        <a:latin typeface="Cambria Math" panose="02040503050406030204" pitchFamily="18" charset="0"/>
+                      </a:rPr>
+                      <m:t>=$299.01</m:t>
+                    </m:r>
+                  </m:oMath>
+                </a14:m>
+                <a:endParaRPr lang="en-US" dirty="0"/>
+              </a:p>
+              <a:p>
+                <a:endParaRPr lang="en-US" dirty="0"/>
+              </a:p>
+            </p:txBody>
+          </p:sp>
+        </mc:Choice>
+        <mc:Fallback xmlns="">
+          <p:sp>
+            <p:nvSpPr>
+              <p:cNvPr id="18" name="TextBox 17">
+                <a:extLst>
+                  <a:ext uri="{FF2B5EF4-FFF2-40B4-BE49-F238E27FC236}">
+                    <a16:creationId xmlns:a16="http://schemas.microsoft.com/office/drawing/2014/main" id="{C3C55055-6FEC-B7C1-C8AF-8632579CBD6F}"/>
+                  </a:ext>
+                </a:extLst>
+              </p:cNvPr>
+              <p:cNvSpPr txBox="1">
+                <a:spLocks noRot="1" noChangeAspect="1" noMove="1" noResize="1" noEditPoints="1" noAdjustHandles="1" noChangeArrowheads="1" noChangeShapeType="1" noTextEdit="1"/>
+              </p:cNvSpPr>
+              <p:nvPr/>
+            </p:nvSpPr>
+            <p:spPr>
+              <a:xfrm>
+                <a:off x="577767" y="4067103"/>
+                <a:ext cx="3366627" cy="954107"/>
+              </a:xfrm>
+              <a:prstGeom prst="rect">
+                <a:avLst/>
+              </a:prstGeom>
+              <a:blipFill>
+                <a:blip r:embed="rId6"/>
+                <a:stretch>
+                  <a:fillRect/>
+                </a:stretch>
+              </a:blipFill>
+            </p:spPr>
+            <p:txBody>
+              <a:bodyPr/>
+              <a:lstStyle/>
+              <a:p>
+                <a:r>
+                  <a:rPr lang="en-US">
+                    <a:noFill/>
+                  </a:rPr>
+                  <a:t> </a:t>
+                </a:r>
+              </a:p>
+            </p:txBody>
+          </p:sp>
+        </mc:Fallback>
+      </mc:AlternateContent>
     </p:spTree>
     <p:extLst>
       <p:ext uri="{BB962C8B-B14F-4D97-AF65-F5344CB8AC3E}">
@@ -13712,28 +14270,23 @@
               <a:rPr lang="en-US" sz="1800" b="1" u="sng" dirty="0"/>
               <a:t>Example</a:t>
             </a:r>
-            <a:endParaRPr lang="en-US" sz="1800" dirty="0"/>
           </a:p>
           <a:p>
             <a:pPr marL="76200" indent="0">
               <a:buNone/>
             </a:pPr>
             <a:r>
-              <a:rPr lang="en-US" sz="1800" dirty="0"/>
-              <a:t>Alaina wants to buy a house, but she doesn’t know how much house she can afford. Her take-home pay is $3220 per month, and she doesn’t want to spend more than the recommended 25% of her take-home pay. She can get a 3.37% APR compounded monthly. If she takes a 30-year mortgage, what is the maximum purchase price she can afford?</a:t>
+              <a:rPr lang="en-US" sz="1600" dirty="0"/>
+              <a:t>Find the mortgage balance after the first three payments on a 30-year $180,000 mortgage that was financed at an APR of 5.25% and has a monthly payment of $993.97.</a:t>
             </a:r>
           </a:p>
           <a:p>
             <a:pPr marL="76200" indent="0">
               <a:buNone/>
             </a:pPr>
-            <a:endParaRPr lang="en-US" sz="600" dirty="0"/>
-          </a:p>
-          <a:p>
-            <a:pPr marL="76200" indent="0">
-              <a:buNone/>
-            </a:pPr>
-            <a:endParaRPr lang="en-US" sz="1000" i="1" dirty="0"/>
+            <a:endParaRPr lang="en-US" sz="1000" i="1" dirty="0">
+              <a:latin typeface="+mn-lt"/>
+            </a:endParaRPr>
           </a:p>
         </p:txBody>
       </p:sp>
@@ -14666,14 +15219,474 @@
           </p:txBody>
         </p:sp>
       </p:grpSp>
+      <p:graphicFrame>
+        <p:nvGraphicFramePr>
+          <p:cNvPr id="9" name="Table 8">
+            <a:extLst>
+              <a:ext uri="{FF2B5EF4-FFF2-40B4-BE49-F238E27FC236}">
+                <a16:creationId xmlns:a16="http://schemas.microsoft.com/office/drawing/2014/main" id="{E48E958C-550E-927B-FC09-E5C971C2FD61}"/>
+              </a:ext>
+            </a:extLst>
+          </p:cNvPr>
+          <p:cNvGraphicFramePr>
+            <a:graphicFrameLocks noGrp="1"/>
+          </p:cNvGraphicFramePr>
+          <p:nvPr>
+            <p:extLst>
+              <p:ext uri="{D42A27DB-BD31-4B8C-83A1-F6EECF244321}">
+                <p14:modId xmlns:p14="http://schemas.microsoft.com/office/powerpoint/2010/main" val="3538449828"/>
+              </p:ext>
+            </p:extLst>
+          </p:nvPr>
+        </p:nvGraphicFramePr>
+        <p:xfrm>
+          <a:off x="814275" y="2334149"/>
+          <a:ext cx="3505199" cy="2374900"/>
+        </p:xfrm>
+        <a:graphic>
+          <a:graphicData uri="http://schemas.openxmlformats.org/drawingml/2006/table">
+            <a:tbl>
+              <a:tblPr>
+                <a:tableStyleId>{29EB7706-96CE-42EF-BD35-F457D1AC9942}</a:tableStyleId>
+              </a:tblPr>
+              <a:tblGrid>
+                <a:gridCol w="826429">
+                  <a:extLst>
+                    <a:ext uri="{9D8B030D-6E8A-4147-A177-3AD203B41FA5}">
+                      <a16:colId xmlns:a16="http://schemas.microsoft.com/office/drawing/2014/main" val="2929492087"/>
+                    </a:ext>
+                  </a:extLst>
+                </a:gridCol>
+                <a:gridCol w="826429">
+                  <a:extLst>
+                    <a:ext uri="{9D8B030D-6E8A-4147-A177-3AD203B41FA5}">
+                      <a16:colId xmlns:a16="http://schemas.microsoft.com/office/drawing/2014/main" val="2016843126"/>
+                    </a:ext>
+                  </a:extLst>
+                </a:gridCol>
+                <a:gridCol w="826429">
+                  <a:extLst>
+                    <a:ext uri="{9D8B030D-6E8A-4147-A177-3AD203B41FA5}">
+                      <a16:colId xmlns:a16="http://schemas.microsoft.com/office/drawing/2014/main" val="666624509"/>
+                    </a:ext>
+                  </a:extLst>
+                </a:gridCol>
+                <a:gridCol w="1025912">
+                  <a:extLst>
+                    <a:ext uri="{9D8B030D-6E8A-4147-A177-3AD203B41FA5}">
+                      <a16:colId xmlns:a16="http://schemas.microsoft.com/office/drawing/2014/main" val="2236063566"/>
+                    </a:ext>
+                  </a:extLst>
+                </a:gridCol>
+              </a:tblGrid>
+              <a:tr h="431800">
+                <a:tc>
+                  <a:txBody>
+                    <a:bodyPr/>
+                    <a:lstStyle/>
+                    <a:p>
+                      <a:pPr algn="l" fontAlgn="b"/>
+                      <a:r>
+                        <a:rPr lang="en-US" sz="1200" b="1" u="none" strike="noStrike">
+                          <a:effectLst/>
+                        </a:rPr>
+                        <a:t>Payment Number</a:t>
+                      </a:r>
+                      <a:endParaRPr lang="en-US" sz="1200" b="1" i="0" u="none" strike="noStrike">
+                        <a:solidFill>
+                          <a:srgbClr val="000000"/>
+                        </a:solidFill>
+                        <a:effectLst/>
+                        <a:latin typeface="Calibri" panose="020F0502020204030204" pitchFamily="34" charset="0"/>
+                      </a:endParaRPr>
+                    </a:p>
+                  </a:txBody>
+                  <a:tcPr marL="9525" marR="9525" marT="9525" marB="0" anchor="b"/>
+                </a:tc>
+                <a:tc>
+                  <a:txBody>
+                    <a:bodyPr/>
+                    <a:lstStyle/>
+                    <a:p>
+                      <a:pPr algn="l" fontAlgn="b"/>
+                      <a:r>
+                        <a:rPr lang="en-US" sz="1200" b="1" u="none" strike="noStrike">
+                          <a:effectLst/>
+                        </a:rPr>
+                        <a:t>Interest Payment</a:t>
+                      </a:r>
+                      <a:endParaRPr lang="en-US" sz="1200" b="1" i="0" u="none" strike="noStrike">
+                        <a:solidFill>
+                          <a:srgbClr val="000000"/>
+                        </a:solidFill>
+                        <a:effectLst/>
+                        <a:latin typeface="Calibri" panose="020F0502020204030204" pitchFamily="34" charset="0"/>
+                      </a:endParaRPr>
+                    </a:p>
+                  </a:txBody>
+                  <a:tcPr marL="9525" marR="9525" marT="9525" marB="0" anchor="b"/>
+                </a:tc>
+                <a:tc>
+                  <a:txBody>
+                    <a:bodyPr/>
+                    <a:lstStyle/>
+                    <a:p>
+                      <a:pPr algn="l" fontAlgn="b"/>
+                      <a:r>
+                        <a:rPr lang="en-US" sz="1200" b="1" u="none" strike="noStrike">
+                          <a:effectLst/>
+                        </a:rPr>
+                        <a:t>Principal Payment</a:t>
+                      </a:r>
+                      <a:endParaRPr lang="en-US" sz="1200" b="1" i="0" u="none" strike="noStrike">
+                        <a:solidFill>
+                          <a:srgbClr val="000000"/>
+                        </a:solidFill>
+                        <a:effectLst/>
+                        <a:latin typeface="Calibri" panose="020F0502020204030204" pitchFamily="34" charset="0"/>
+                      </a:endParaRPr>
+                    </a:p>
+                  </a:txBody>
+                  <a:tcPr marL="9525" marR="9525" marT="9525" marB="0" anchor="b"/>
+                </a:tc>
+                <a:tc>
+                  <a:txBody>
+                    <a:bodyPr/>
+                    <a:lstStyle/>
+                    <a:p>
+                      <a:pPr algn="l" fontAlgn="b"/>
+                      <a:r>
+                        <a:rPr lang="en-US" sz="1200" b="1" u="none" strike="noStrike" dirty="0">
+                          <a:effectLst/>
+                        </a:rPr>
+                        <a:t>Mortgage Balance</a:t>
+                      </a:r>
+                      <a:endParaRPr lang="en-US" sz="1200" b="1" i="0" u="none" strike="noStrike" dirty="0">
+                        <a:solidFill>
+                          <a:srgbClr val="000000"/>
+                        </a:solidFill>
+                        <a:effectLst/>
+                        <a:latin typeface="Calibri" panose="020F0502020204030204" pitchFamily="34" charset="0"/>
+                      </a:endParaRPr>
+                    </a:p>
+                  </a:txBody>
+                  <a:tcPr marL="9525" marR="9525" marT="9525" marB="0" anchor="b"/>
+                </a:tc>
+                <a:extLst>
+                  <a:ext uri="{0D108BD9-81ED-4DB2-BD59-A6C34878D82A}">
+                    <a16:rowId xmlns:a16="http://schemas.microsoft.com/office/drawing/2014/main" val="1571653376"/>
+                  </a:ext>
+                </a:extLst>
+              </a:tr>
+              <a:tr h="647700">
+                <a:tc>
+                  <a:txBody>
+                    <a:bodyPr/>
+                    <a:lstStyle/>
+                    <a:p>
+                      <a:pPr algn="l" fontAlgn="t"/>
+                      <a:r>
+                        <a:rPr lang="en-US" sz="1200" u="none" strike="noStrike">
+                          <a:effectLst/>
+                        </a:rPr>
+                        <a:t>1</a:t>
+                      </a:r>
+                      <a:endParaRPr lang="en-US" sz="1200" b="0" i="0" u="none" strike="noStrike">
+                        <a:solidFill>
+                          <a:srgbClr val="000000"/>
+                        </a:solidFill>
+                        <a:effectLst/>
+                        <a:latin typeface="Calibri" panose="020F0502020204030204" pitchFamily="34" charset="0"/>
+                      </a:endParaRPr>
+                    </a:p>
+                  </a:txBody>
+                  <a:tcPr marL="9525" marR="9525" marT="9525" marB="0"/>
+                </a:tc>
+                <a:tc>
+                  <a:txBody>
+                    <a:bodyPr/>
+                    <a:lstStyle/>
+                    <a:p>
+                      <a:pPr algn="l" fontAlgn="t"/>
+                      <a:r>
+                        <a:rPr lang="en-US" sz="1200" u="none" strike="noStrike">
+                          <a:effectLst/>
+                        </a:rPr>
+                        <a:t>$787.50</a:t>
+                      </a:r>
+                      <a:endParaRPr lang="en-US" sz="1200" b="0" i="0" u="none" strike="noStrike">
+                        <a:solidFill>
+                          <a:srgbClr val="000000"/>
+                        </a:solidFill>
+                        <a:effectLst/>
+                        <a:latin typeface="Calibri" panose="020F0502020204030204" pitchFamily="34" charset="0"/>
+                      </a:endParaRPr>
+                    </a:p>
+                  </a:txBody>
+                  <a:tcPr marL="9525" marR="9525" marT="9525" marB="0"/>
+                </a:tc>
+                <a:tc>
+                  <a:txBody>
+                    <a:bodyPr/>
+                    <a:lstStyle/>
+                    <a:p>
+                      <a:pPr algn="l" fontAlgn="t"/>
+                      <a:r>
+                        <a:rPr lang="en-US" sz="1200" u="none" strike="noStrike">
+                          <a:effectLst/>
+                        </a:rPr>
+                        <a:t>$206.47</a:t>
+                      </a:r>
+                      <a:endParaRPr lang="en-US" sz="1200" b="0" i="0" u="none" strike="noStrike">
+                        <a:solidFill>
+                          <a:srgbClr val="000000"/>
+                        </a:solidFill>
+                        <a:effectLst/>
+                        <a:latin typeface="Calibri" panose="020F0502020204030204" pitchFamily="34" charset="0"/>
+                      </a:endParaRPr>
+                    </a:p>
+                  </a:txBody>
+                  <a:tcPr marL="9525" marR="9525" marT="9525" marB="0"/>
+                </a:tc>
+                <a:tc>
+                  <a:txBody>
+                    <a:bodyPr/>
+                    <a:lstStyle/>
+                    <a:p>
+                      <a:pPr algn="l" fontAlgn="t"/>
+                      <a:r>
+                        <a:rPr lang="en-US" sz="1200" u="none" strike="noStrike">
+                          <a:effectLst/>
+                        </a:rPr>
+                        <a:t> </a:t>
+                      </a:r>
+                      <a:endParaRPr lang="en-US" sz="1200" b="0" i="0" u="none" strike="noStrike">
+                        <a:solidFill>
+                          <a:srgbClr val="000000"/>
+                        </a:solidFill>
+                        <a:effectLst/>
+                        <a:latin typeface="Calibri" panose="020F0502020204030204" pitchFamily="34" charset="0"/>
+                      </a:endParaRPr>
+                    </a:p>
+                  </a:txBody>
+                  <a:tcPr marL="9525" marR="9525" marT="9525" marB="0"/>
+                </a:tc>
+                <a:extLst>
+                  <a:ext uri="{0D108BD9-81ED-4DB2-BD59-A6C34878D82A}">
+                    <a16:rowId xmlns:a16="http://schemas.microsoft.com/office/drawing/2014/main" val="2810497654"/>
+                  </a:ext>
+                </a:extLst>
+              </a:tr>
+              <a:tr h="647700">
+                <a:tc>
+                  <a:txBody>
+                    <a:bodyPr/>
+                    <a:lstStyle/>
+                    <a:p>
+                      <a:pPr algn="l" fontAlgn="t"/>
+                      <a:r>
+                        <a:rPr lang="en-US" sz="1200" u="none" strike="noStrike">
+                          <a:effectLst/>
+                        </a:rPr>
+                        <a:t>2</a:t>
+                      </a:r>
+                      <a:endParaRPr lang="en-US" sz="1200" b="0" i="0" u="none" strike="noStrike">
+                        <a:solidFill>
+                          <a:srgbClr val="000000"/>
+                        </a:solidFill>
+                        <a:effectLst/>
+                        <a:latin typeface="Calibri" panose="020F0502020204030204" pitchFamily="34" charset="0"/>
+                      </a:endParaRPr>
+                    </a:p>
+                  </a:txBody>
+                  <a:tcPr marL="9525" marR="9525" marT="9525" marB="0"/>
+                </a:tc>
+                <a:tc>
+                  <a:txBody>
+                    <a:bodyPr/>
+                    <a:lstStyle/>
+                    <a:p>
+                      <a:pPr algn="l" fontAlgn="t"/>
+                      <a:r>
+                        <a:rPr lang="en-US" sz="1200" u="none" strike="noStrike">
+                          <a:effectLst/>
+                        </a:rPr>
+                        <a:t>$786.60</a:t>
+                      </a:r>
+                      <a:endParaRPr lang="en-US" sz="1200" b="0" i="0" u="none" strike="noStrike">
+                        <a:solidFill>
+                          <a:srgbClr val="000000"/>
+                        </a:solidFill>
+                        <a:effectLst/>
+                        <a:latin typeface="Calibri" panose="020F0502020204030204" pitchFamily="34" charset="0"/>
+                      </a:endParaRPr>
+                    </a:p>
+                  </a:txBody>
+                  <a:tcPr marL="9525" marR="9525" marT="9525" marB="0"/>
+                </a:tc>
+                <a:tc>
+                  <a:txBody>
+                    <a:bodyPr/>
+                    <a:lstStyle/>
+                    <a:p>
+                      <a:pPr algn="l" fontAlgn="t"/>
+                      <a:r>
+                        <a:rPr lang="en-US" sz="1200" u="none" strike="noStrike">
+                          <a:effectLst/>
+                        </a:rPr>
+                        <a:t>$207.37</a:t>
+                      </a:r>
+                      <a:endParaRPr lang="en-US" sz="1200" b="0" i="0" u="none" strike="noStrike">
+                        <a:solidFill>
+                          <a:srgbClr val="000000"/>
+                        </a:solidFill>
+                        <a:effectLst/>
+                        <a:latin typeface="Calibri" panose="020F0502020204030204" pitchFamily="34" charset="0"/>
+                      </a:endParaRPr>
+                    </a:p>
+                  </a:txBody>
+                  <a:tcPr marL="9525" marR="9525" marT="9525" marB="0"/>
+                </a:tc>
+                <a:tc>
+                  <a:txBody>
+                    <a:bodyPr/>
+                    <a:lstStyle/>
+                    <a:p>
+                      <a:pPr algn="l" fontAlgn="t"/>
+                      <a:r>
+                        <a:rPr lang="en-US" sz="1200" u="none" strike="noStrike">
+                          <a:effectLst/>
+                        </a:rPr>
+                        <a:t> </a:t>
+                      </a:r>
+                      <a:endParaRPr lang="en-US" sz="1200" b="0" i="0" u="none" strike="noStrike">
+                        <a:solidFill>
+                          <a:srgbClr val="000000"/>
+                        </a:solidFill>
+                        <a:effectLst/>
+                        <a:latin typeface="Calibri" panose="020F0502020204030204" pitchFamily="34" charset="0"/>
+                      </a:endParaRPr>
+                    </a:p>
+                  </a:txBody>
+                  <a:tcPr marL="9525" marR="9525" marT="9525" marB="0"/>
+                </a:tc>
+                <a:extLst>
+                  <a:ext uri="{0D108BD9-81ED-4DB2-BD59-A6C34878D82A}">
+                    <a16:rowId xmlns:a16="http://schemas.microsoft.com/office/drawing/2014/main" val="35236020"/>
+                  </a:ext>
+                </a:extLst>
+              </a:tr>
+              <a:tr h="647700">
+                <a:tc>
+                  <a:txBody>
+                    <a:bodyPr/>
+                    <a:lstStyle/>
+                    <a:p>
+                      <a:pPr algn="l" fontAlgn="t"/>
+                      <a:r>
+                        <a:rPr lang="en-US" sz="1200" u="none" strike="noStrike">
+                          <a:effectLst/>
+                        </a:rPr>
+                        <a:t>3</a:t>
+                      </a:r>
+                      <a:endParaRPr lang="en-US" sz="1200" b="0" i="0" u="none" strike="noStrike">
+                        <a:solidFill>
+                          <a:srgbClr val="000000"/>
+                        </a:solidFill>
+                        <a:effectLst/>
+                        <a:latin typeface="Calibri" panose="020F0502020204030204" pitchFamily="34" charset="0"/>
+                      </a:endParaRPr>
+                    </a:p>
+                  </a:txBody>
+                  <a:tcPr marL="9525" marR="9525" marT="9525" marB="0"/>
+                </a:tc>
+                <a:tc>
+                  <a:txBody>
+                    <a:bodyPr/>
+                    <a:lstStyle/>
+                    <a:p>
+                      <a:pPr algn="l" fontAlgn="t"/>
+                      <a:r>
+                        <a:rPr lang="en-US" sz="1200" u="none" strike="noStrike">
+                          <a:effectLst/>
+                        </a:rPr>
+                        <a:t>$785.69</a:t>
+                      </a:r>
+                      <a:endParaRPr lang="en-US" sz="1200" b="0" i="0" u="none" strike="noStrike">
+                        <a:solidFill>
+                          <a:srgbClr val="000000"/>
+                        </a:solidFill>
+                        <a:effectLst/>
+                        <a:latin typeface="Calibri" panose="020F0502020204030204" pitchFamily="34" charset="0"/>
+                      </a:endParaRPr>
+                    </a:p>
+                  </a:txBody>
+                  <a:tcPr marL="9525" marR="9525" marT="9525" marB="0"/>
+                </a:tc>
+                <a:tc>
+                  <a:txBody>
+                    <a:bodyPr/>
+                    <a:lstStyle/>
+                    <a:p>
+                      <a:pPr algn="l" fontAlgn="t"/>
+                      <a:r>
+                        <a:rPr lang="en-US" sz="1200" u="none" strike="noStrike" dirty="0">
+                          <a:effectLst/>
+                        </a:rPr>
+                        <a:t>$208.28</a:t>
+                      </a:r>
+                      <a:endParaRPr lang="en-US" sz="1200" b="0" i="0" u="none" strike="noStrike" dirty="0">
+                        <a:solidFill>
+                          <a:srgbClr val="000000"/>
+                        </a:solidFill>
+                        <a:effectLst/>
+                        <a:latin typeface="Calibri" panose="020F0502020204030204" pitchFamily="34" charset="0"/>
+                      </a:endParaRPr>
+                    </a:p>
+                  </a:txBody>
+                  <a:tcPr marL="9525" marR="9525" marT="9525" marB="0"/>
+                </a:tc>
+                <a:tc>
+                  <a:txBody>
+                    <a:bodyPr/>
+                    <a:lstStyle/>
+                    <a:p>
+                      <a:pPr algn="l" fontAlgn="t"/>
+                      <a:r>
+                        <a:rPr lang="en-US" sz="1200" u="none" strike="noStrike" dirty="0">
+                          <a:effectLst/>
+                        </a:rPr>
+                        <a:t> </a:t>
+                      </a:r>
+                      <a:endParaRPr lang="en-US" sz="1200" b="0" i="0" u="none" strike="noStrike" dirty="0">
+                        <a:solidFill>
+                          <a:srgbClr val="000000"/>
+                        </a:solidFill>
+                        <a:effectLst/>
+                        <a:latin typeface="Calibri" panose="020F0502020204030204" pitchFamily="34" charset="0"/>
+                      </a:endParaRPr>
+                    </a:p>
+                  </a:txBody>
+                  <a:tcPr marL="9525" marR="9525" marT="9525" marB="0"/>
+                </a:tc>
+                <a:extLst>
+                  <a:ext uri="{0D108BD9-81ED-4DB2-BD59-A6C34878D82A}">
+                    <a16:rowId xmlns:a16="http://schemas.microsoft.com/office/drawing/2014/main" val="4165263723"/>
+                  </a:ext>
+                </a:extLst>
+              </a:tr>
+            </a:tbl>
+          </a:graphicData>
+        </a:graphic>
+      </p:graphicFrame>
       <mc:AlternateContent xmlns:mc="http://schemas.openxmlformats.org/markup-compatibility/2006" xmlns:a14="http://schemas.microsoft.com/office/drawing/2010/main">
         <mc:Choice Requires="a14">
           <p:sp>
             <p:nvSpPr>
-              <p:cNvPr id="5" name="TextBox 4">
+              <p:cNvPr id="10" name="TextBox 9">
                 <a:extLst>
                   <a:ext uri="{FF2B5EF4-FFF2-40B4-BE49-F238E27FC236}">
-                    <a16:creationId xmlns:a16="http://schemas.microsoft.com/office/drawing/2014/main" id="{7D80BBEC-1849-BBEF-768F-B6953B7D4343}"/>
+                    <a16:creationId xmlns:a16="http://schemas.microsoft.com/office/drawing/2014/main" id="{3E476799-B503-5F9B-BBF0-386ECFF3503C}"/>
                   </a:ext>
                 </a:extLst>
               </p:cNvPr>
@@ -14682,8 +15695,8 @@
             </p:nvSpPr>
             <p:spPr>
               <a:xfrm>
-                <a:off x="2152812" y="4370980"/>
-                <a:ext cx="2419188" cy="523220"/>
+                <a:off x="4378972" y="2367662"/>
+                <a:ext cx="4360616" cy="307777"/>
               </a:xfrm>
               <a:prstGeom prst="rect">
                 <a:avLst/>
@@ -14704,23 +15717,80 @@
                     </m:oMathParaPr>
                     <m:oMath xmlns:m="http://schemas.openxmlformats.org/officeDocument/2006/math">
                       <m:r>
-                        <a:rPr lang="en-US" sz="1400" b="0" i="1" smtClean="0">
+                        <a:rPr lang="en-US" b="0" i="1" smtClean="0">
                           <a:latin typeface="Cambria Math" panose="02040503050406030204" pitchFamily="18" charset="0"/>
                         </a:rPr>
-                        <m:t>𝑃𝑀𝑇</m:t>
+                        <m:t>𝑁𝑒𝑤</m:t>
                       </m:r>
                       <m:r>
-                        <a:rPr lang="en-US" sz="1400" b="0" i="1" smtClean="0">
+                        <a:rPr lang="en-US" b="0" i="1" smtClean="0">
                           <a:latin typeface="Cambria Math" panose="02040503050406030204" pitchFamily="18" charset="0"/>
                         </a:rPr>
-                        <m:t>=0.25(3,220)=$805</m:t>
+                        <m:t> </m:t>
+                      </m:r>
+                      <m:r>
+                        <a:rPr lang="en-US" b="0" i="1" smtClean="0">
+                          <a:latin typeface="Cambria Math" panose="02040503050406030204" pitchFamily="18" charset="0"/>
+                        </a:rPr>
+                        <m:t>𝐵𝑎𝑙𝑎𝑛𝑐𝑒</m:t>
+                      </m:r>
+                      <m:r>
+                        <a:rPr lang="en-US" b="0" i="1" smtClean="0">
+                          <a:latin typeface="Cambria Math" panose="02040503050406030204" pitchFamily="18" charset="0"/>
+                        </a:rPr>
+                        <m:t>=</m:t>
+                      </m:r>
+                      <m:r>
+                        <a:rPr lang="en-US" b="0" i="1" smtClean="0">
+                          <a:latin typeface="Cambria Math" panose="02040503050406030204" pitchFamily="18" charset="0"/>
+                        </a:rPr>
+                        <m:t>𝑂𝑙𝑑</m:t>
+                      </m:r>
+                      <m:r>
+                        <a:rPr lang="en-US" b="0" i="1" smtClean="0">
+                          <a:latin typeface="Cambria Math" panose="02040503050406030204" pitchFamily="18" charset="0"/>
+                        </a:rPr>
+                        <m:t> </m:t>
+                      </m:r>
+                      <m:r>
+                        <a:rPr lang="en-US" b="0" i="1" smtClean="0">
+                          <a:latin typeface="Cambria Math" panose="02040503050406030204" pitchFamily="18" charset="0"/>
+                        </a:rPr>
+                        <m:t>𝐵𝑎𝑙𝑎𝑛𝑐𝑒</m:t>
+                      </m:r>
+                      <m:r>
+                        <a:rPr lang="en-US" b="0" i="1" smtClean="0">
+                          <a:latin typeface="Cambria Math" panose="02040503050406030204" pitchFamily="18" charset="0"/>
+                        </a:rPr>
+                        <m:t> −</m:t>
+                      </m:r>
+                      <m:r>
+                        <a:rPr lang="en-US" b="0" i="1" smtClean="0">
+                          <a:latin typeface="Cambria Math" panose="02040503050406030204" pitchFamily="18" charset="0"/>
+                        </a:rPr>
+                        <m:t>𝑃𝑟𝑖𝑛𝑐𝑖𝑝𝑎𝑙</m:t>
+                      </m:r>
+                      <m:r>
+                        <a:rPr lang="en-US" b="0" i="1" smtClean="0">
+                          <a:latin typeface="Cambria Math" panose="02040503050406030204" pitchFamily="18" charset="0"/>
+                        </a:rPr>
+                        <m:t> </m:t>
+                      </m:r>
+                      <m:r>
+                        <a:rPr lang="en-US" b="0" i="1" smtClean="0">
+                          <a:latin typeface="Cambria Math" panose="02040503050406030204" pitchFamily="18" charset="0"/>
+                        </a:rPr>
+                        <m:t>𝑃𝑎𝑦𝑚𝑒𝑛𝑡</m:t>
+                      </m:r>
+                      <m:r>
+                        <a:rPr lang="en-US" b="0" i="1" smtClean="0">
+                          <a:latin typeface="Cambria Math" panose="02040503050406030204" pitchFamily="18" charset="0"/>
+                        </a:rPr>
+                        <m:t>  </m:t>
                       </m:r>
                     </m:oMath>
                   </m:oMathPara>
                 </a14:m>
-                <a:endParaRPr lang="en-US" sz="1400" b="0" i="1" dirty="0"/>
-              </a:p>
-              <a:p>
                 <a:endParaRPr lang="en-US" dirty="0"/>
               </a:p>
             </p:txBody>
@@ -14729,10 +15799,10 @@
         <mc:Fallback xmlns="">
           <p:sp>
             <p:nvSpPr>
-              <p:cNvPr id="5" name="TextBox 4">
+              <p:cNvPr id="10" name="TextBox 9">
                 <a:extLst>
                   <a:ext uri="{FF2B5EF4-FFF2-40B4-BE49-F238E27FC236}">
-                    <a16:creationId xmlns:a16="http://schemas.microsoft.com/office/drawing/2014/main" id="{7D80BBEC-1849-BBEF-768F-B6953B7D4343}"/>
+                    <a16:creationId xmlns:a16="http://schemas.microsoft.com/office/drawing/2014/main" id="{3E476799-B503-5F9B-BBF0-386ECFF3503C}"/>
                   </a:ext>
                 </a:extLst>
               </p:cNvPr>
@@ -14743,14 +15813,286 @@
             </p:nvSpPr>
             <p:spPr>
               <a:xfrm>
-                <a:off x="2152812" y="4370980"/>
-                <a:ext cx="2419188" cy="523220"/>
+                <a:off x="4378972" y="2367662"/>
+                <a:ext cx="4360616" cy="307777"/>
               </a:xfrm>
               <a:prstGeom prst="rect">
                 <a:avLst/>
               </a:prstGeom>
               <a:blipFill>
                 <a:blip r:embed="rId3"/>
+                <a:stretch>
+                  <a:fillRect b="-16000"/>
+                </a:stretch>
+              </a:blipFill>
+            </p:spPr>
+            <p:txBody>
+              <a:bodyPr/>
+              <a:lstStyle/>
+              <a:p>
+                <a:r>
+                  <a:rPr lang="en-US">
+                    <a:noFill/>
+                  </a:rPr>
+                  <a:t> </a:t>
+                </a:r>
+              </a:p>
+            </p:txBody>
+          </p:sp>
+        </mc:Fallback>
+      </mc:AlternateContent>
+      <mc:AlternateContent xmlns:mc="http://schemas.openxmlformats.org/markup-compatibility/2006" xmlns:a14="http://schemas.microsoft.com/office/drawing/2010/main">
+        <mc:Choice Requires="a14">
+          <p:sp>
+            <p:nvSpPr>
+              <p:cNvPr id="11" name="TextBox 10">
+                <a:extLst>
+                  <a:ext uri="{FF2B5EF4-FFF2-40B4-BE49-F238E27FC236}">
+                    <a16:creationId xmlns:a16="http://schemas.microsoft.com/office/drawing/2014/main" id="{305A69F5-2BF4-EA58-D2D2-3D463590D9C9}"/>
+                  </a:ext>
+                </a:extLst>
+              </p:cNvPr>
+              <p:cNvSpPr txBox="1"/>
+              <p:nvPr/>
+            </p:nvSpPr>
+            <p:spPr>
+              <a:xfrm>
+                <a:off x="4364885" y="2865890"/>
+                <a:ext cx="1328890" cy="1600438"/>
+              </a:xfrm>
+              <a:prstGeom prst="rect">
+                <a:avLst/>
+              </a:prstGeom>
+              <a:noFill/>
+            </p:spPr>
+            <p:txBody>
+              <a:bodyPr wrap="none" rtlCol="0">
+                <a:spAutoFit/>
+              </a:bodyPr>
+              <a:lstStyle/>
+              <a:p>
+                <a:pPr/>
+                <a14:m>
+                  <m:oMathPara xmlns:m="http://schemas.openxmlformats.org/officeDocument/2006/math">
+                    <m:oMathParaPr>
+                      <m:jc m:val="centerGroup"/>
+                    </m:oMathParaPr>
+                    <m:oMath xmlns:m="http://schemas.openxmlformats.org/officeDocument/2006/math">
+                      <m:r>
+                        <a:rPr lang="en-US" b="0" i="1" smtClean="0">
+                          <a:latin typeface="Cambria Math" panose="02040503050406030204" pitchFamily="18" charset="0"/>
+                        </a:rPr>
+                        <m:t>𝐵𝑎𝑙𝑎𝑛𝑐𝑒</m:t>
+                      </m:r>
+                      <m:r>
+                        <a:rPr lang="en-US" b="0" i="1" smtClean="0">
+                          <a:latin typeface="Cambria Math" panose="02040503050406030204" pitchFamily="18" charset="0"/>
+                        </a:rPr>
+                        <m:t> 1= </m:t>
+                      </m:r>
+                    </m:oMath>
+                  </m:oMathPara>
+                </a14:m>
+                <a:endParaRPr lang="en-US" b="0" dirty="0"/>
+              </a:p>
+              <a:p>
+                <a:endParaRPr lang="en-US" dirty="0"/>
+              </a:p>
+              <a:p>
+                <a:endParaRPr lang="en-US" dirty="0"/>
+              </a:p>
+              <a:p>
+                <a:pPr/>
+                <a14:m>
+                  <m:oMathPara xmlns:m="http://schemas.openxmlformats.org/officeDocument/2006/math">
+                    <m:oMathParaPr>
+                      <m:jc m:val="centerGroup"/>
+                    </m:oMathParaPr>
+                    <m:oMath xmlns:m="http://schemas.openxmlformats.org/officeDocument/2006/math">
+                      <m:r>
+                        <a:rPr lang="en-US" b="0" i="1" smtClean="0">
+                          <a:latin typeface="Cambria Math" panose="02040503050406030204" pitchFamily="18" charset="0"/>
+                        </a:rPr>
+                        <m:t>𝐵𝑎𝑙𝑎𝑛𝑐𝑒</m:t>
+                      </m:r>
+                      <m:r>
+                        <a:rPr lang="en-US" b="0" i="1" smtClean="0">
+                          <a:latin typeface="Cambria Math" panose="02040503050406030204" pitchFamily="18" charset="0"/>
+                        </a:rPr>
+                        <m:t> 2= </m:t>
+                      </m:r>
+                    </m:oMath>
+                  </m:oMathPara>
+                </a14:m>
+                <a:endParaRPr lang="en-US" b="0" dirty="0"/>
+              </a:p>
+              <a:p>
+                <a:endParaRPr lang="en-US" dirty="0"/>
+              </a:p>
+              <a:p>
+                <a:endParaRPr lang="en-US" dirty="0"/>
+              </a:p>
+              <a:p>
+                <a:pPr/>
+                <a14:m>
+                  <m:oMathPara xmlns:m="http://schemas.openxmlformats.org/officeDocument/2006/math">
+                    <m:oMathParaPr>
+                      <m:jc m:val="centerGroup"/>
+                    </m:oMathParaPr>
+                    <m:oMath xmlns:m="http://schemas.openxmlformats.org/officeDocument/2006/math">
+                      <m:r>
+                        <a:rPr lang="en-US" b="0" i="1" smtClean="0">
+                          <a:latin typeface="Cambria Math" panose="02040503050406030204" pitchFamily="18" charset="0"/>
+                        </a:rPr>
+                        <m:t>𝐵𝑎𝑙𝑎𝑛𝑐𝑒</m:t>
+                      </m:r>
+                      <m:r>
+                        <a:rPr lang="en-US" b="0" i="1" smtClean="0">
+                          <a:latin typeface="Cambria Math" panose="02040503050406030204" pitchFamily="18" charset="0"/>
+                        </a:rPr>
+                        <m:t> 3= </m:t>
+                      </m:r>
+                    </m:oMath>
+                  </m:oMathPara>
+                </a14:m>
+                <a:endParaRPr lang="en-US" dirty="0"/>
+              </a:p>
+            </p:txBody>
+          </p:sp>
+        </mc:Choice>
+        <mc:Fallback xmlns="">
+          <p:sp>
+            <p:nvSpPr>
+              <p:cNvPr id="11" name="TextBox 10">
+                <a:extLst>
+                  <a:ext uri="{FF2B5EF4-FFF2-40B4-BE49-F238E27FC236}">
+                    <a16:creationId xmlns:a16="http://schemas.microsoft.com/office/drawing/2014/main" id="{305A69F5-2BF4-EA58-D2D2-3D463590D9C9}"/>
+                  </a:ext>
+                </a:extLst>
+              </p:cNvPr>
+              <p:cNvSpPr txBox="1">
+                <a:spLocks noRot="1" noChangeAspect="1" noMove="1" noResize="1" noEditPoints="1" noAdjustHandles="1" noChangeArrowheads="1" noChangeShapeType="1" noTextEdit="1"/>
+              </p:cNvSpPr>
+              <p:nvPr/>
+            </p:nvSpPr>
+            <p:spPr>
+              <a:xfrm>
+                <a:off x="4364885" y="2865890"/>
+                <a:ext cx="1328890" cy="1600438"/>
+              </a:xfrm>
+              <a:prstGeom prst="rect">
+                <a:avLst/>
+              </a:prstGeom>
+              <a:blipFill>
+                <a:blip r:embed="rId4"/>
+                <a:stretch>
+                  <a:fillRect b="-1575"/>
+                </a:stretch>
+              </a:blipFill>
+            </p:spPr>
+            <p:txBody>
+              <a:bodyPr/>
+              <a:lstStyle/>
+              <a:p>
+                <a:r>
+                  <a:rPr lang="en-US">
+                    <a:noFill/>
+                  </a:rPr>
+                  <a:t> </a:t>
+                </a:r>
+              </a:p>
+            </p:txBody>
+          </p:sp>
+        </mc:Fallback>
+      </mc:AlternateContent>
+      <mc:AlternateContent xmlns:mc="http://schemas.openxmlformats.org/markup-compatibility/2006" xmlns:a14="http://schemas.microsoft.com/office/drawing/2010/main">
+        <mc:Choice Requires="a14">
+          <p:sp>
+            <p:nvSpPr>
+              <p:cNvPr id="12" name="TextBox 11">
+                <a:extLst>
+                  <a:ext uri="{FF2B5EF4-FFF2-40B4-BE49-F238E27FC236}">
+                    <a16:creationId xmlns:a16="http://schemas.microsoft.com/office/drawing/2014/main" id="{1C485609-D1A4-B264-76A2-50A4D2FEFECC}"/>
+                  </a:ext>
+                </a:extLst>
+              </p:cNvPr>
+              <p:cNvSpPr txBox="1"/>
+              <p:nvPr/>
+            </p:nvSpPr>
+            <p:spPr>
+              <a:xfrm>
+                <a:off x="5481152" y="2863305"/>
+                <a:ext cx="1851404" cy="307777"/>
+              </a:xfrm>
+              <a:prstGeom prst="rect">
+                <a:avLst/>
+              </a:prstGeom>
+              <a:noFill/>
+            </p:spPr>
+            <p:txBody>
+              <a:bodyPr wrap="none" rtlCol="0">
+                <a:spAutoFit/>
+              </a:bodyPr>
+              <a:lstStyle/>
+              <a:p>
+                <a:pPr/>
+                <a14:m>
+                  <m:oMathPara xmlns:m="http://schemas.openxmlformats.org/officeDocument/2006/math">
+                    <m:oMathParaPr>
+                      <m:jc m:val="centerGroup"/>
+                    </m:oMathParaPr>
+                    <m:oMath xmlns:m="http://schemas.openxmlformats.org/officeDocument/2006/math">
+                      <m:r>
+                        <a:rPr lang="en-US" i="1" dirty="0" smtClean="0">
+                          <a:latin typeface="Cambria Math" panose="02040503050406030204" pitchFamily="18" charset="0"/>
+                        </a:rPr>
+                        <m:t>180,000</m:t>
+                      </m:r>
+                      <m:r>
+                        <a:rPr lang="en-US" b="0" i="1" dirty="0" smtClean="0">
+                          <a:latin typeface="Cambria Math" panose="02040503050406030204" pitchFamily="18" charset="0"/>
+                        </a:rPr>
+                        <m:t>.00</m:t>
+                      </m:r>
+                      <m:r>
+                        <a:rPr lang="en-US" i="1" dirty="0" smtClean="0">
+                          <a:latin typeface="Cambria Math" panose="02040503050406030204" pitchFamily="18" charset="0"/>
+                        </a:rPr>
+                        <m:t>−206.47</m:t>
+                      </m:r>
+                    </m:oMath>
+                  </m:oMathPara>
+                </a14:m>
+                <a:endParaRPr lang="en-US" dirty="0"/>
+              </a:p>
+            </p:txBody>
+          </p:sp>
+        </mc:Choice>
+        <mc:Fallback xmlns="">
+          <p:sp>
+            <p:nvSpPr>
+              <p:cNvPr id="12" name="TextBox 11">
+                <a:extLst>
+                  <a:ext uri="{FF2B5EF4-FFF2-40B4-BE49-F238E27FC236}">
+                    <a16:creationId xmlns:a16="http://schemas.microsoft.com/office/drawing/2014/main" id="{1C485609-D1A4-B264-76A2-50A4D2FEFECC}"/>
+                  </a:ext>
+                </a:extLst>
+              </p:cNvPr>
+              <p:cNvSpPr txBox="1">
+                <a:spLocks noRot="1" noChangeAspect="1" noMove="1" noResize="1" noEditPoints="1" noAdjustHandles="1" noChangeArrowheads="1" noChangeShapeType="1" noTextEdit="1"/>
+              </p:cNvSpPr>
+              <p:nvPr/>
+            </p:nvSpPr>
+            <p:spPr>
+              <a:xfrm>
+                <a:off x="5481152" y="2863305"/>
+                <a:ext cx="1851404" cy="307777"/>
+              </a:xfrm>
+              <a:prstGeom prst="rect">
+                <a:avLst/>
+              </a:prstGeom>
+              <a:blipFill>
+                <a:blip r:embed="rId5"/>
                 <a:stretch>
                   <a:fillRect/>
                 </a:stretch>
@@ -14775,10 +16117,10 @@
         <mc:Choice Requires="a14">
           <p:sp>
             <p:nvSpPr>
-              <p:cNvPr id="6" name="TextBox 5">
+              <p:cNvPr id="13" name="TextBox 12">
                 <a:extLst>
                   <a:ext uri="{FF2B5EF4-FFF2-40B4-BE49-F238E27FC236}">
-                    <a16:creationId xmlns:a16="http://schemas.microsoft.com/office/drawing/2014/main" id="{32CD0985-0ABB-3647-047D-888ECEF54CA2}"/>
+                    <a16:creationId xmlns:a16="http://schemas.microsoft.com/office/drawing/2014/main" id="{0CCDD03D-1DB5-CF4B-D130-FAE55CA87C08}"/>
                   </a:ext>
                 </a:extLst>
               </p:cNvPr>
@@ -14787,8 +16129,8 @@
             </p:nvSpPr>
             <p:spPr>
               <a:xfrm>
-                <a:off x="-404550" y="3456223"/>
-                <a:ext cx="4887748" cy="1053943"/>
+                <a:off x="7157722" y="2863079"/>
+                <a:ext cx="1379095" cy="307777"/>
               </a:xfrm>
               <a:prstGeom prst="rect">
                 <a:avLst/>
@@ -14809,195 +16151,14 @@
                     </m:oMathParaPr>
                     <m:oMath xmlns:m="http://schemas.openxmlformats.org/officeDocument/2006/math">
                       <m:r>
-                        <a:rPr lang="en-US" sz="1400" i="1" smtClean="0">
+                        <a:rPr lang="en-US" b="0" i="1" dirty="0" smtClean="0">
                           <a:latin typeface="Cambria Math" panose="02040503050406030204" pitchFamily="18" charset="0"/>
                         </a:rPr>
-                        <m:t>𝑀𝑎𝑥</m:t>
+                        <m:t>=$179,793.53</m:t>
                       </m:r>
-                      <m:r>
-                        <a:rPr lang="en-US" sz="1400" b="0" i="1" smtClean="0">
-                          <a:latin typeface="Cambria Math" panose="02040503050406030204" pitchFamily="18" charset="0"/>
-                        </a:rPr>
-                        <m:t> </m:t>
-                      </m:r>
-                      <m:r>
-                        <a:rPr lang="en-US" sz="1400" b="0" i="1" smtClean="0">
-                          <a:latin typeface="Cambria Math" panose="02040503050406030204" pitchFamily="18" charset="0"/>
-                        </a:rPr>
-                        <m:t>𝑃𝑢𝑟𝑐h𝑎𝑠𝑒</m:t>
-                      </m:r>
-                      <m:r>
-                        <a:rPr lang="en-US" sz="1400" b="0" i="1" smtClean="0">
-                          <a:latin typeface="Cambria Math" panose="02040503050406030204" pitchFamily="18" charset="0"/>
-                        </a:rPr>
-                        <m:t> </m:t>
-                      </m:r>
-                      <m:r>
-                        <a:rPr lang="en-US" sz="1400" i="1">
-                          <a:latin typeface="Cambria Math" panose="02040503050406030204" pitchFamily="18" charset="0"/>
-                        </a:rPr>
-                        <m:t>𝑃𝑟𝑖𝑐𝑒</m:t>
-                      </m:r>
-                      <m:r>
-                        <a:rPr lang="en-US" sz="1400" i="1">
-                          <a:latin typeface="Cambria Math" panose="02040503050406030204" pitchFamily="18" charset="0"/>
-                        </a:rPr>
-                        <m:t>=</m:t>
-                      </m:r>
-                      <m:r>
-                        <a:rPr lang="en-US" sz="1400" i="1">
-                          <a:latin typeface="Cambria Math" panose="02040503050406030204" pitchFamily="18" charset="0"/>
-                        </a:rPr>
-                        <m:t>𝑃𝑀𝑇</m:t>
-                      </m:r>
-                      <m:r>
-                        <a:rPr lang="en-US" sz="1400" i="1">
-                          <a:latin typeface="Cambria Math" panose="02040503050406030204" pitchFamily="18" charset="0"/>
-                          <a:ea typeface="Cambria Math" panose="02040503050406030204" pitchFamily="18" charset="0"/>
-                        </a:rPr>
-                        <m:t>∙</m:t>
-                      </m:r>
-                      <m:f>
-                        <m:fPr>
-                          <m:ctrlPr>
-                            <a:rPr lang="en-US" sz="1400" i="1">
-                              <a:latin typeface="Cambria Math" panose="02040503050406030204" pitchFamily="18" charset="0"/>
-                            </a:rPr>
-                          </m:ctrlPr>
-                        </m:fPr>
-                        <m:num>
-                          <m:d>
-                            <m:dPr>
-                              <m:begChr m:val="["/>
-                              <m:endChr m:val="]"/>
-                              <m:ctrlPr>
-                                <a:rPr lang="en-US" sz="1400" i="1">
-                                  <a:latin typeface="Cambria Math" panose="02040503050406030204" pitchFamily="18" charset="0"/>
-                                </a:rPr>
-                              </m:ctrlPr>
-                            </m:dPr>
-                            <m:e>
-                              <m:r>
-                                <a:rPr lang="en-US" sz="1400" i="1">
-                                  <a:latin typeface="Cambria Math" panose="02040503050406030204" pitchFamily="18" charset="0"/>
-                                </a:rPr>
-                                <m:t>1−</m:t>
-                              </m:r>
-                              <m:sSup>
-                                <m:sSupPr>
-                                  <m:ctrlPr>
-                                    <a:rPr lang="en-US" sz="1400" i="1">
-                                      <a:latin typeface="Cambria Math" panose="02040503050406030204" pitchFamily="18" charset="0"/>
-                                    </a:rPr>
-                                  </m:ctrlPr>
-                                </m:sSupPr>
-                                <m:e>
-                                  <m:d>
-                                    <m:dPr>
-                                      <m:ctrlPr>
-                                        <a:rPr lang="en-US" sz="1400" i="1">
-                                          <a:latin typeface="Cambria Math" panose="02040503050406030204" pitchFamily="18" charset="0"/>
-                                        </a:rPr>
-                                      </m:ctrlPr>
-                                    </m:dPr>
-                                    <m:e>
-                                      <m:r>
-                                        <a:rPr lang="en-US" sz="1400" i="1">
-                                          <a:latin typeface="Cambria Math" panose="02040503050406030204" pitchFamily="18" charset="0"/>
-                                        </a:rPr>
-                                        <m:t>1+</m:t>
-                                      </m:r>
-                                      <m:f>
-                                        <m:fPr>
-                                          <m:ctrlPr>
-                                            <a:rPr lang="en-US" sz="1400" i="1">
-                                              <a:latin typeface="Cambria Math" panose="02040503050406030204" pitchFamily="18" charset="0"/>
-                                            </a:rPr>
-                                          </m:ctrlPr>
-                                        </m:fPr>
-                                        <m:num>
-                                          <m:r>
-                                            <a:rPr lang="en-US" sz="1400" i="1">
-                                              <a:latin typeface="Cambria Math" panose="02040503050406030204" pitchFamily="18" charset="0"/>
-                                            </a:rPr>
-                                            <m:t>𝑟</m:t>
-                                          </m:r>
-                                        </m:num>
-                                        <m:den>
-                                          <m:r>
-                                            <a:rPr lang="en-US" sz="1400" i="1">
-                                              <a:latin typeface="Cambria Math" panose="02040503050406030204" pitchFamily="18" charset="0"/>
-                                            </a:rPr>
-                                            <m:t>𝑛</m:t>
-                                          </m:r>
-                                        </m:den>
-                                      </m:f>
-                                    </m:e>
-                                  </m:d>
-                                </m:e>
-                                <m:sup>
-                                  <m:r>
-                                    <a:rPr lang="en-US" sz="1400" i="1">
-                                      <a:latin typeface="Cambria Math" panose="02040503050406030204" pitchFamily="18" charset="0"/>
-                                    </a:rPr>
-                                    <m:t>−</m:t>
-                                  </m:r>
-                                  <m:r>
-                                    <a:rPr lang="en-US" sz="1400" i="1">
-                                      <a:latin typeface="Cambria Math" panose="02040503050406030204" pitchFamily="18" charset="0"/>
-                                    </a:rPr>
-                                    <m:t>𝑛𝑡</m:t>
-                                  </m:r>
-                                </m:sup>
-                              </m:sSup>
-                            </m:e>
-                          </m:d>
-                        </m:num>
-                        <m:den>
-                          <m:d>
-                            <m:dPr>
-                              <m:ctrlPr>
-                                <a:rPr lang="en-US" sz="1400" i="1">
-                                  <a:latin typeface="Cambria Math" panose="02040503050406030204" pitchFamily="18" charset="0"/>
-                                </a:rPr>
-                              </m:ctrlPr>
-                            </m:dPr>
-                            <m:e>
-                              <m:f>
-                                <m:fPr>
-                                  <m:ctrlPr>
-                                    <a:rPr lang="en-US" sz="1400" i="1">
-                                      <a:latin typeface="Cambria Math" panose="02040503050406030204" pitchFamily="18" charset="0"/>
-                                    </a:rPr>
-                                  </m:ctrlPr>
-                                </m:fPr>
-                                <m:num>
-                                  <m:r>
-                                    <a:rPr lang="en-US" sz="1400" i="1">
-                                      <a:latin typeface="Cambria Math" panose="02040503050406030204" pitchFamily="18" charset="0"/>
-                                    </a:rPr>
-                                    <m:t>𝑟</m:t>
-                                  </m:r>
-                                </m:num>
-                                <m:den>
-                                  <m:r>
-                                    <a:rPr lang="en-US" sz="1400" i="1">
-                                      <a:latin typeface="Cambria Math" panose="02040503050406030204" pitchFamily="18" charset="0"/>
-                                    </a:rPr>
-                                    <m:t>𝑛</m:t>
-                                  </m:r>
-                                </m:den>
-                              </m:f>
-                            </m:e>
-                          </m:d>
-                        </m:den>
-                      </m:f>
                     </m:oMath>
                   </m:oMathPara>
                 </a14:m>
-                <a:endParaRPr lang="en-US" sz="1400" dirty="0"/>
-              </a:p>
-              <a:p>
                 <a:endParaRPr lang="en-US" dirty="0"/>
               </a:p>
             </p:txBody>
@@ -15006,10 +16167,10 @@
         <mc:Fallback xmlns="">
           <p:sp>
             <p:nvSpPr>
-              <p:cNvPr id="6" name="TextBox 5">
+              <p:cNvPr id="13" name="TextBox 12">
                 <a:extLst>
                   <a:ext uri="{FF2B5EF4-FFF2-40B4-BE49-F238E27FC236}">
-                    <a16:creationId xmlns:a16="http://schemas.microsoft.com/office/drawing/2014/main" id="{32CD0985-0ABB-3647-047D-888ECEF54CA2}"/>
+                    <a16:creationId xmlns:a16="http://schemas.microsoft.com/office/drawing/2014/main" id="{0CCDD03D-1DB5-CF4B-D130-FAE55CA87C08}"/>
                   </a:ext>
                 </a:extLst>
               </p:cNvPr>
@@ -15020,14 +16181,14 @@
             </p:nvSpPr>
             <p:spPr>
               <a:xfrm>
-                <a:off x="-404550" y="3456223"/>
-                <a:ext cx="4887748" cy="1053943"/>
+                <a:off x="7157722" y="2863079"/>
+                <a:ext cx="1379095" cy="307777"/>
               </a:xfrm>
               <a:prstGeom prst="rect">
                 <a:avLst/>
               </a:prstGeom>
               <a:blipFill>
-                <a:blip r:embed="rId4"/>
+                <a:blip r:embed="rId6"/>
                 <a:stretch>
                   <a:fillRect/>
                 </a:stretch>
@@ -15052,10 +16213,10 @@
         <mc:Choice Requires="a14">
           <p:sp>
             <p:nvSpPr>
-              <p:cNvPr id="7" name="TextBox 6">
+              <p:cNvPr id="14" name="TextBox 13">
                 <a:extLst>
                   <a:ext uri="{FF2B5EF4-FFF2-40B4-BE49-F238E27FC236}">
-                    <a16:creationId xmlns:a16="http://schemas.microsoft.com/office/drawing/2014/main" id="{B5B76291-FF67-F445-219D-F29879227D41}"/>
+                    <a16:creationId xmlns:a16="http://schemas.microsoft.com/office/drawing/2014/main" id="{BF00A1EB-7A77-7B36-9A62-9D92CCCA0A72}"/>
                   </a:ext>
                 </a:extLst>
               </p:cNvPr>
@@ -15064,8 +16225,8 @@
             </p:nvSpPr>
             <p:spPr>
               <a:xfrm>
-                <a:off x="4413954" y="3339188"/>
-                <a:ext cx="2763705" cy="951992"/>
+                <a:off x="5490836" y="3520344"/>
+                <a:ext cx="1851404" cy="307777"/>
               </a:xfrm>
               <a:prstGeom prst="rect">
                 <a:avLst/>
@@ -15086,160 +16247,17 @@
                     </m:oMathParaPr>
                     <m:oMath xmlns:m="http://schemas.openxmlformats.org/officeDocument/2006/math">
                       <m:r>
-                        <a:rPr lang="en-US" sz="1400" b="0" i="1" smtClean="0">
+                        <a:rPr lang="en-US" i="1" dirty="0" smtClean="0">
                           <a:latin typeface="Cambria Math" panose="02040503050406030204" pitchFamily="18" charset="0"/>
                         </a:rPr>
-                        <m:t>=805</m:t>
+                        <m:t>179,793.53−</m:t>
                       </m:r>
                       <m:r>
-                        <a:rPr lang="en-US" sz="1400" b="0" i="1" smtClean="0">
+                        <a:rPr lang="en-US" b="0" i="1" dirty="0" smtClean="0">
                           <a:latin typeface="Cambria Math" panose="02040503050406030204" pitchFamily="18" charset="0"/>
-                          <a:ea typeface="Cambria Math" panose="02040503050406030204" pitchFamily="18" charset="0"/>
                         </a:rPr>
-                        <m:t>∙</m:t>
+                        <m:t>207.37</m:t>
                       </m:r>
-                      <m:f>
-                        <m:fPr>
-                          <m:ctrlPr>
-                            <a:rPr lang="en-US" sz="1400" i="1">
-                              <a:latin typeface="Cambria Math" panose="02040503050406030204" pitchFamily="18" charset="0"/>
-                            </a:rPr>
-                          </m:ctrlPr>
-                        </m:fPr>
-                        <m:num>
-                          <m:d>
-                            <m:dPr>
-                              <m:begChr m:val="["/>
-                              <m:endChr m:val="]"/>
-                              <m:ctrlPr>
-                                <a:rPr lang="en-US" sz="1400" i="1">
-                                  <a:latin typeface="Cambria Math" panose="02040503050406030204" pitchFamily="18" charset="0"/>
-                                </a:rPr>
-                              </m:ctrlPr>
-                            </m:dPr>
-                            <m:e>
-                              <m:r>
-                                <a:rPr lang="en-US" sz="1400" i="1">
-                                  <a:latin typeface="Cambria Math" panose="02040503050406030204" pitchFamily="18" charset="0"/>
-                                </a:rPr>
-                                <m:t>1−</m:t>
-                              </m:r>
-                              <m:sSup>
-                                <m:sSupPr>
-                                  <m:ctrlPr>
-                                    <a:rPr lang="en-US" sz="1400" i="1">
-                                      <a:latin typeface="Cambria Math" panose="02040503050406030204" pitchFamily="18" charset="0"/>
-                                    </a:rPr>
-                                  </m:ctrlPr>
-                                </m:sSupPr>
-                                <m:e>
-                                  <m:d>
-                                    <m:dPr>
-                                      <m:ctrlPr>
-                                        <a:rPr lang="en-US" sz="1400" i="1">
-                                          <a:latin typeface="Cambria Math" panose="02040503050406030204" pitchFamily="18" charset="0"/>
-                                        </a:rPr>
-                                      </m:ctrlPr>
-                                    </m:dPr>
-                                    <m:e>
-                                      <m:r>
-                                        <a:rPr lang="en-US" sz="1400" i="1">
-                                          <a:latin typeface="Cambria Math" panose="02040503050406030204" pitchFamily="18" charset="0"/>
-                                        </a:rPr>
-                                        <m:t>1+</m:t>
-                                      </m:r>
-                                      <m:f>
-                                        <m:fPr>
-                                          <m:ctrlPr>
-                                            <a:rPr lang="en-US" sz="1400" i="1">
-                                              <a:latin typeface="Cambria Math" panose="02040503050406030204" pitchFamily="18" charset="0"/>
-                                            </a:rPr>
-                                          </m:ctrlPr>
-                                        </m:fPr>
-                                        <m:num>
-                                          <m:r>
-                                            <a:rPr lang="en-US" sz="1400" b="0" i="1" smtClean="0">
-                                              <a:latin typeface="Cambria Math" panose="02040503050406030204" pitchFamily="18" charset="0"/>
-                                            </a:rPr>
-                                            <m:t>0.0337</m:t>
-                                          </m:r>
-                                        </m:num>
-                                        <m:den>
-                                          <m:r>
-                                            <a:rPr lang="en-US" sz="1400" b="0" i="1" smtClean="0">
-                                              <a:latin typeface="Cambria Math" panose="02040503050406030204" pitchFamily="18" charset="0"/>
-                                            </a:rPr>
-                                            <m:t>12</m:t>
-                                          </m:r>
-                                        </m:den>
-                                      </m:f>
-                                    </m:e>
-                                  </m:d>
-                                </m:e>
-                                <m:sup>
-                                  <m:r>
-                                    <a:rPr lang="en-US" sz="1400" i="1">
-                                      <a:latin typeface="Cambria Math" panose="02040503050406030204" pitchFamily="18" charset="0"/>
-                                    </a:rPr>
-                                    <m:t>−</m:t>
-                                  </m:r>
-                                  <m:r>
-                                    <a:rPr lang="en-US" sz="1400" b="0" i="1" smtClean="0">
-                                      <a:latin typeface="Cambria Math" panose="02040503050406030204" pitchFamily="18" charset="0"/>
-                                    </a:rPr>
-                                    <m:t>12</m:t>
-                                  </m:r>
-                                  <m:r>
-                                    <a:rPr lang="en-US" sz="1400" b="0" i="1" smtClean="0">
-                                      <a:latin typeface="Cambria Math" panose="02040503050406030204" pitchFamily="18" charset="0"/>
-                                      <a:ea typeface="Cambria Math" panose="02040503050406030204" pitchFamily="18" charset="0"/>
-                                    </a:rPr>
-                                    <m:t>∙30</m:t>
-                                  </m:r>
-                                </m:sup>
-                              </m:sSup>
-                            </m:e>
-                          </m:d>
-                        </m:num>
-                        <m:den>
-                          <m:d>
-                            <m:dPr>
-                              <m:ctrlPr>
-                                <a:rPr lang="en-US" sz="1400" i="1">
-                                  <a:latin typeface="Cambria Math" panose="02040503050406030204" pitchFamily="18" charset="0"/>
-                                </a:rPr>
-                              </m:ctrlPr>
-                            </m:dPr>
-                            <m:e>
-                              <m:f>
-                                <m:fPr>
-                                  <m:ctrlPr>
-                                    <a:rPr lang="en-US" sz="1400" i="1">
-                                      <a:latin typeface="Cambria Math" panose="02040503050406030204" pitchFamily="18" charset="0"/>
-                                    </a:rPr>
-                                  </m:ctrlPr>
-                                </m:fPr>
-                                <m:num>
-                                  <m:r>
-                                    <a:rPr lang="en-US" sz="1400" b="0" i="1" smtClean="0">
-                                      <a:latin typeface="Cambria Math" panose="02040503050406030204" pitchFamily="18" charset="0"/>
-                                    </a:rPr>
-                                    <m:t>0.0337</m:t>
-                                  </m:r>
-                                </m:num>
-                                <m:den>
-                                  <m:r>
-                                    <a:rPr lang="en-US" sz="1400" b="0" i="1" smtClean="0">
-                                      <a:latin typeface="Cambria Math" panose="02040503050406030204" pitchFamily="18" charset="0"/>
-                                    </a:rPr>
-                                    <m:t>12</m:t>
-                                  </m:r>
-                                </m:den>
-                              </m:f>
-                            </m:e>
-                          </m:d>
-                        </m:den>
-                      </m:f>
                     </m:oMath>
                   </m:oMathPara>
                 </a14:m>
@@ -15251,10 +16269,10 @@
         <mc:Fallback xmlns="">
           <p:sp>
             <p:nvSpPr>
-              <p:cNvPr id="7" name="TextBox 6">
+              <p:cNvPr id="14" name="TextBox 13">
                 <a:extLst>
                   <a:ext uri="{FF2B5EF4-FFF2-40B4-BE49-F238E27FC236}">
-                    <a16:creationId xmlns:a16="http://schemas.microsoft.com/office/drawing/2014/main" id="{B5B76291-FF67-F445-219D-F29879227D41}"/>
+                    <a16:creationId xmlns:a16="http://schemas.microsoft.com/office/drawing/2014/main" id="{BF00A1EB-7A77-7B36-9A62-9D92CCCA0A72}"/>
                   </a:ext>
                 </a:extLst>
               </p:cNvPr>
@@ -15265,16 +16283,16 @@
             </p:nvSpPr>
             <p:spPr>
               <a:xfrm>
-                <a:off x="4413954" y="3339188"/>
-                <a:ext cx="2763705" cy="951992"/>
+                <a:off x="5490836" y="3520344"/>
+                <a:ext cx="1851404" cy="307777"/>
               </a:xfrm>
               <a:prstGeom prst="rect">
                 <a:avLst/>
               </a:prstGeom>
               <a:blipFill>
-                <a:blip r:embed="rId5"/>
+                <a:blip r:embed="rId7"/>
                 <a:stretch>
-                  <a:fillRect b="-1333"/>
+                  <a:fillRect/>
                 </a:stretch>
               </a:blipFill>
             </p:spPr>
@@ -15293,14 +16311,14 @@
           </p:sp>
         </mc:Fallback>
       </mc:AlternateContent>
-      <mc:AlternateContent xmlns:mc="http://schemas.openxmlformats.org/markup-compatibility/2006">
-        <mc:Choice xmlns:a14="http://schemas.microsoft.com/office/drawing/2010/main" Requires="a14">
+      <mc:AlternateContent xmlns:mc="http://schemas.openxmlformats.org/markup-compatibility/2006" xmlns:a14="http://schemas.microsoft.com/office/drawing/2010/main">
+        <mc:Choice Requires="a14">
           <p:sp>
             <p:nvSpPr>
-              <p:cNvPr id="8" name="TextBox 7">
+              <p:cNvPr id="15" name="TextBox 14">
                 <a:extLst>
                   <a:ext uri="{FF2B5EF4-FFF2-40B4-BE49-F238E27FC236}">
-                    <a16:creationId xmlns:a16="http://schemas.microsoft.com/office/drawing/2014/main" id="{979AFF20-02F7-98D4-B3E4-926DADBEB8E6}"/>
+                    <a16:creationId xmlns:a16="http://schemas.microsoft.com/office/drawing/2014/main" id="{5711B884-9C12-EC7A-2258-564B26636813}"/>
                   </a:ext>
                 </a:extLst>
               </p:cNvPr>
@@ -15309,8 +16327,8 @@
             </p:nvSpPr>
             <p:spPr>
               <a:xfrm>
-                <a:off x="7177659" y="3705458"/>
-                <a:ext cx="1375889" cy="307777"/>
+                <a:off x="7227889" y="3505289"/>
+                <a:ext cx="1379095" cy="307777"/>
               </a:xfrm>
               <a:prstGeom prst="rect">
                 <a:avLst/>
@@ -15331,25 +16349,10 @@
                     </m:oMathParaPr>
                     <m:oMath xmlns:m="http://schemas.openxmlformats.org/officeDocument/2006/math">
                       <m:r>
-                        <a:rPr lang="en-US" sz="1400" i="1" smtClean="0">
+                        <a:rPr lang="en-US" b="0" i="1" dirty="0" smtClean="0">
                           <a:latin typeface="Cambria Math" panose="02040503050406030204" pitchFamily="18" charset="0"/>
-                          <a:ea typeface="Cambria Math" panose="02040503050406030204" pitchFamily="18" charset="0"/>
                         </a:rPr>
-                        <m:t>≈</m:t>
-                      </m:r>
-                      <m:r>
-                        <a:rPr lang="en-US" sz="1400" b="0" i="1" smtClean="0">
-                          <a:latin typeface="Cambria Math" panose="02040503050406030204" pitchFamily="18" charset="0"/>
-                          <a:ea typeface="Cambria Math" panose="02040503050406030204" pitchFamily="18" charset="0"/>
-                        </a:rPr>
-                        <m:t>$182,201.1</m:t>
-                      </m:r>
-                      <m:r>
-                        <a:rPr lang="en-US" sz="1400" b="0" i="1" smtClean="0">
-                          <a:latin typeface="Cambria Math" panose="02040503050406030204" pitchFamily="18" charset="0"/>
-                          <a:ea typeface="Cambria Math" panose="02040503050406030204" pitchFamily="18" charset="0"/>
-                        </a:rPr>
-                        <m:t>1</m:t>
+                        <m:t>=$179,586.16</m:t>
                       </m:r>
                     </m:oMath>
                   </m:oMathPara>
@@ -15359,13 +16362,13 @@
             </p:txBody>
           </p:sp>
         </mc:Choice>
-        <mc:Fallback>
+        <mc:Fallback xmlns="">
           <p:sp>
             <p:nvSpPr>
-              <p:cNvPr id="8" name="TextBox 7">
+              <p:cNvPr id="15" name="TextBox 14">
                 <a:extLst>
                   <a:ext uri="{FF2B5EF4-FFF2-40B4-BE49-F238E27FC236}">
-                    <a16:creationId xmlns:a16="http://schemas.microsoft.com/office/drawing/2014/main" id="{979AFF20-02F7-98D4-B3E4-926DADBEB8E6}"/>
+                    <a16:creationId xmlns:a16="http://schemas.microsoft.com/office/drawing/2014/main" id="{5711B884-9C12-EC7A-2258-564B26636813}"/>
                   </a:ext>
                 </a:extLst>
               </p:cNvPr>
@@ -15376,16 +16379,502 @@
             </p:nvSpPr>
             <p:spPr>
               <a:xfrm>
-                <a:off x="7177659" y="3705458"/>
-                <a:ext cx="1375889" cy="307777"/>
+                <a:off x="7227889" y="3505289"/>
+                <a:ext cx="1379095" cy="307777"/>
               </a:xfrm>
               <a:prstGeom prst="rect">
                 <a:avLst/>
               </a:prstGeom>
               <a:blipFill>
-                <a:blip r:embed="rId6"/>
+                <a:blip r:embed="rId8"/>
                 <a:stretch>
-                  <a:fillRect b="-4000"/>
+                  <a:fillRect/>
+                </a:stretch>
+              </a:blipFill>
+            </p:spPr>
+            <p:txBody>
+              <a:bodyPr/>
+              <a:lstStyle/>
+              <a:p>
+                <a:r>
+                  <a:rPr lang="en-US">
+                    <a:noFill/>
+                  </a:rPr>
+                  <a:t> </a:t>
+                </a:r>
+              </a:p>
+            </p:txBody>
+          </p:sp>
+        </mc:Fallback>
+      </mc:AlternateContent>
+      <mc:AlternateContent xmlns:mc="http://schemas.openxmlformats.org/markup-compatibility/2006" xmlns:a14="http://schemas.microsoft.com/office/drawing/2010/main">
+        <mc:Choice Requires="a14">
+          <p:sp>
+            <p:nvSpPr>
+              <p:cNvPr id="22" name="TextBox 21">
+                <a:extLst>
+                  <a:ext uri="{FF2B5EF4-FFF2-40B4-BE49-F238E27FC236}">
+                    <a16:creationId xmlns:a16="http://schemas.microsoft.com/office/drawing/2014/main" id="{FC8AF749-133D-9510-D9F8-3DA0F37E6D52}"/>
+                  </a:ext>
+                </a:extLst>
+              </p:cNvPr>
+              <p:cNvSpPr txBox="1"/>
+              <p:nvPr/>
+            </p:nvSpPr>
+            <p:spPr>
+              <a:xfrm>
+                <a:off x="5490836" y="4148252"/>
+                <a:ext cx="1851404" cy="307777"/>
+              </a:xfrm>
+              <a:prstGeom prst="rect">
+                <a:avLst/>
+              </a:prstGeom>
+              <a:noFill/>
+            </p:spPr>
+            <p:txBody>
+              <a:bodyPr wrap="none" rtlCol="0">
+                <a:spAutoFit/>
+              </a:bodyPr>
+              <a:lstStyle/>
+              <a:p>
+                <a:pPr/>
+                <a14:m>
+                  <m:oMathPara xmlns:m="http://schemas.openxmlformats.org/officeDocument/2006/math">
+                    <m:oMathParaPr>
+                      <m:jc m:val="centerGroup"/>
+                    </m:oMathParaPr>
+                    <m:oMath xmlns:m="http://schemas.openxmlformats.org/officeDocument/2006/math">
+                      <m:r>
+                        <a:rPr lang="en-US" i="1" dirty="0" smtClean="0">
+                          <a:latin typeface="Cambria Math" panose="02040503050406030204" pitchFamily="18" charset="0"/>
+                        </a:rPr>
+                        <m:t>179,586.16−</m:t>
+                      </m:r>
+                      <m:r>
+                        <a:rPr lang="en-US" b="0" i="1" dirty="0" smtClean="0">
+                          <a:latin typeface="Cambria Math" panose="02040503050406030204" pitchFamily="18" charset="0"/>
+                        </a:rPr>
+                        <m:t>208.28</m:t>
+                      </m:r>
+                    </m:oMath>
+                  </m:oMathPara>
+                </a14:m>
+                <a:endParaRPr lang="en-US" dirty="0"/>
+              </a:p>
+            </p:txBody>
+          </p:sp>
+        </mc:Choice>
+        <mc:Fallback xmlns="">
+          <p:sp>
+            <p:nvSpPr>
+              <p:cNvPr id="22" name="TextBox 21">
+                <a:extLst>
+                  <a:ext uri="{FF2B5EF4-FFF2-40B4-BE49-F238E27FC236}">
+                    <a16:creationId xmlns:a16="http://schemas.microsoft.com/office/drawing/2014/main" id="{FC8AF749-133D-9510-D9F8-3DA0F37E6D52}"/>
+                  </a:ext>
+                </a:extLst>
+              </p:cNvPr>
+              <p:cNvSpPr txBox="1">
+                <a:spLocks noRot="1" noChangeAspect="1" noMove="1" noResize="1" noEditPoints="1" noAdjustHandles="1" noChangeArrowheads="1" noChangeShapeType="1" noTextEdit="1"/>
+              </p:cNvSpPr>
+              <p:nvPr/>
+            </p:nvSpPr>
+            <p:spPr>
+              <a:xfrm>
+                <a:off x="5490836" y="4148252"/>
+                <a:ext cx="1851404" cy="307777"/>
+              </a:xfrm>
+              <a:prstGeom prst="rect">
+                <a:avLst/>
+              </a:prstGeom>
+              <a:blipFill>
+                <a:blip r:embed="rId9"/>
+                <a:stretch>
+                  <a:fillRect/>
+                </a:stretch>
+              </a:blipFill>
+            </p:spPr>
+            <p:txBody>
+              <a:bodyPr/>
+              <a:lstStyle/>
+              <a:p>
+                <a:r>
+                  <a:rPr lang="en-US">
+                    <a:noFill/>
+                  </a:rPr>
+                  <a:t> </a:t>
+                </a:r>
+              </a:p>
+            </p:txBody>
+          </p:sp>
+        </mc:Fallback>
+      </mc:AlternateContent>
+      <mc:AlternateContent xmlns:mc="http://schemas.openxmlformats.org/markup-compatibility/2006" xmlns:a14="http://schemas.microsoft.com/office/drawing/2010/main">
+        <mc:Choice Requires="a14">
+          <p:sp>
+            <p:nvSpPr>
+              <p:cNvPr id="23" name="TextBox 22">
+                <a:extLst>
+                  <a:ext uri="{FF2B5EF4-FFF2-40B4-BE49-F238E27FC236}">
+                    <a16:creationId xmlns:a16="http://schemas.microsoft.com/office/drawing/2014/main" id="{BDF80477-6D55-2E29-5443-B446980A1CDB}"/>
+                  </a:ext>
+                </a:extLst>
+              </p:cNvPr>
+              <p:cNvSpPr txBox="1"/>
+              <p:nvPr/>
+            </p:nvSpPr>
+            <p:spPr>
+              <a:xfrm>
+                <a:off x="7167405" y="4163785"/>
+                <a:ext cx="1379095" cy="307777"/>
+              </a:xfrm>
+              <a:prstGeom prst="rect">
+                <a:avLst/>
+              </a:prstGeom>
+              <a:noFill/>
+            </p:spPr>
+            <p:txBody>
+              <a:bodyPr wrap="none" rtlCol="0">
+                <a:spAutoFit/>
+              </a:bodyPr>
+              <a:lstStyle/>
+              <a:p>
+                <a:pPr/>
+                <a14:m>
+                  <m:oMathPara xmlns:m="http://schemas.openxmlformats.org/officeDocument/2006/math">
+                    <m:oMathParaPr>
+                      <m:jc m:val="centerGroup"/>
+                    </m:oMathParaPr>
+                    <m:oMath xmlns:m="http://schemas.openxmlformats.org/officeDocument/2006/math">
+                      <m:r>
+                        <a:rPr lang="en-US" b="0" i="1" dirty="0" smtClean="0">
+                          <a:latin typeface="Cambria Math" panose="02040503050406030204" pitchFamily="18" charset="0"/>
+                        </a:rPr>
+                        <m:t>=$179,377.88</m:t>
+                      </m:r>
+                    </m:oMath>
+                  </m:oMathPara>
+                </a14:m>
+                <a:endParaRPr lang="en-US" dirty="0"/>
+              </a:p>
+            </p:txBody>
+          </p:sp>
+        </mc:Choice>
+        <mc:Fallback xmlns="">
+          <p:sp>
+            <p:nvSpPr>
+              <p:cNvPr id="23" name="TextBox 22">
+                <a:extLst>
+                  <a:ext uri="{FF2B5EF4-FFF2-40B4-BE49-F238E27FC236}">
+                    <a16:creationId xmlns:a16="http://schemas.microsoft.com/office/drawing/2014/main" id="{BDF80477-6D55-2E29-5443-B446980A1CDB}"/>
+                  </a:ext>
+                </a:extLst>
+              </p:cNvPr>
+              <p:cNvSpPr txBox="1">
+                <a:spLocks noRot="1" noChangeAspect="1" noMove="1" noResize="1" noEditPoints="1" noAdjustHandles="1" noChangeArrowheads="1" noChangeShapeType="1" noTextEdit="1"/>
+              </p:cNvSpPr>
+              <p:nvPr/>
+            </p:nvSpPr>
+            <p:spPr>
+              <a:xfrm>
+                <a:off x="7167405" y="4163785"/>
+                <a:ext cx="1379095" cy="307777"/>
+              </a:xfrm>
+              <a:prstGeom prst="rect">
+                <a:avLst/>
+              </a:prstGeom>
+              <a:blipFill>
+                <a:blip r:embed="rId10"/>
+                <a:stretch>
+                  <a:fillRect/>
+                </a:stretch>
+              </a:blipFill>
+            </p:spPr>
+            <p:txBody>
+              <a:bodyPr/>
+              <a:lstStyle/>
+              <a:p>
+                <a:r>
+                  <a:rPr lang="en-US">
+                    <a:noFill/>
+                  </a:rPr>
+                  <a:t> </a:t>
+                </a:r>
+              </a:p>
+            </p:txBody>
+          </p:sp>
+        </mc:Fallback>
+      </mc:AlternateContent>
+      <mc:AlternateContent xmlns:mc="http://schemas.openxmlformats.org/markup-compatibility/2006" xmlns:a14="http://schemas.microsoft.com/office/drawing/2010/main">
+        <mc:Choice Requires="a14">
+          <p:sp>
+            <p:nvSpPr>
+              <p:cNvPr id="24" name="TextBox 23">
+                <a:extLst>
+                  <a:ext uri="{FF2B5EF4-FFF2-40B4-BE49-F238E27FC236}">
+                    <a16:creationId xmlns:a16="http://schemas.microsoft.com/office/drawing/2014/main" id="{1CFCFD9C-8F59-BE63-DE0D-3DC3C370432A}"/>
+                  </a:ext>
+                </a:extLst>
+              </p:cNvPr>
+              <p:cNvSpPr txBox="1"/>
+              <p:nvPr/>
+            </p:nvSpPr>
+            <p:spPr>
+              <a:xfrm>
+                <a:off x="3196145" y="2863079"/>
+                <a:ext cx="1050288" cy="276999"/>
+              </a:xfrm>
+              <a:prstGeom prst="rect">
+                <a:avLst/>
+              </a:prstGeom>
+              <a:noFill/>
+            </p:spPr>
+            <p:txBody>
+              <a:bodyPr wrap="none" rtlCol="0">
+                <a:spAutoFit/>
+              </a:bodyPr>
+              <a:lstStyle/>
+              <a:p>
+                <a:pPr/>
+                <a14:m>
+                  <m:oMathPara xmlns:m="http://schemas.openxmlformats.org/officeDocument/2006/math">
+                    <m:oMathParaPr>
+                      <m:jc m:val="centerGroup"/>
+                    </m:oMathParaPr>
+                    <m:oMath xmlns:m="http://schemas.openxmlformats.org/officeDocument/2006/math">
+                      <m:r>
+                        <a:rPr lang="en-US" sz="1200" b="0" i="1" dirty="0" smtClean="0">
+                          <a:latin typeface="Cambria Math" panose="02040503050406030204" pitchFamily="18" charset="0"/>
+                        </a:rPr>
+                        <m:t>$179,793.53</m:t>
+                      </m:r>
+                    </m:oMath>
+                  </m:oMathPara>
+                </a14:m>
+                <a:endParaRPr lang="en-US" sz="1200" dirty="0"/>
+              </a:p>
+            </p:txBody>
+          </p:sp>
+        </mc:Choice>
+        <mc:Fallback xmlns="">
+          <p:sp>
+            <p:nvSpPr>
+              <p:cNvPr id="24" name="TextBox 23">
+                <a:extLst>
+                  <a:ext uri="{FF2B5EF4-FFF2-40B4-BE49-F238E27FC236}">
+                    <a16:creationId xmlns:a16="http://schemas.microsoft.com/office/drawing/2014/main" id="{1CFCFD9C-8F59-BE63-DE0D-3DC3C370432A}"/>
+                  </a:ext>
+                </a:extLst>
+              </p:cNvPr>
+              <p:cNvSpPr txBox="1">
+                <a:spLocks noRot="1" noChangeAspect="1" noMove="1" noResize="1" noEditPoints="1" noAdjustHandles="1" noChangeArrowheads="1" noChangeShapeType="1" noTextEdit="1"/>
+              </p:cNvSpPr>
+              <p:nvPr/>
+            </p:nvSpPr>
+            <p:spPr>
+              <a:xfrm>
+                <a:off x="3196145" y="2863079"/>
+                <a:ext cx="1050288" cy="276999"/>
+              </a:xfrm>
+              <a:prstGeom prst="rect">
+                <a:avLst/>
+              </a:prstGeom>
+              <a:blipFill>
+                <a:blip r:embed="rId11"/>
+                <a:stretch>
+                  <a:fillRect/>
+                </a:stretch>
+              </a:blipFill>
+            </p:spPr>
+            <p:txBody>
+              <a:bodyPr/>
+              <a:lstStyle/>
+              <a:p>
+                <a:r>
+                  <a:rPr lang="en-US">
+                    <a:noFill/>
+                  </a:rPr>
+                  <a:t> </a:t>
+                </a:r>
+              </a:p>
+            </p:txBody>
+          </p:sp>
+        </mc:Fallback>
+      </mc:AlternateContent>
+      <mc:AlternateContent xmlns:mc="http://schemas.openxmlformats.org/markup-compatibility/2006" xmlns:a14="http://schemas.microsoft.com/office/drawing/2010/main">
+        <mc:Choice Requires="a14">
+          <p:sp>
+            <p:nvSpPr>
+              <p:cNvPr id="25" name="TextBox 24">
+                <a:extLst>
+                  <a:ext uri="{FF2B5EF4-FFF2-40B4-BE49-F238E27FC236}">
+                    <a16:creationId xmlns:a16="http://schemas.microsoft.com/office/drawing/2014/main" id="{F49BC8A8-76FB-6D18-898D-63C9D8EBD793}"/>
+                  </a:ext>
+                </a:extLst>
+              </p:cNvPr>
+              <p:cNvSpPr txBox="1"/>
+              <p:nvPr/>
+            </p:nvSpPr>
+            <p:spPr>
+              <a:xfrm>
+                <a:off x="3205828" y="3520677"/>
+                <a:ext cx="1050288" cy="276999"/>
+              </a:xfrm>
+              <a:prstGeom prst="rect">
+                <a:avLst/>
+              </a:prstGeom>
+              <a:noFill/>
+            </p:spPr>
+            <p:txBody>
+              <a:bodyPr wrap="none" rtlCol="0">
+                <a:spAutoFit/>
+              </a:bodyPr>
+              <a:lstStyle/>
+              <a:p>
+                <a:pPr/>
+                <a14:m>
+                  <m:oMathPara xmlns:m="http://schemas.openxmlformats.org/officeDocument/2006/math">
+                    <m:oMathParaPr>
+                      <m:jc m:val="centerGroup"/>
+                    </m:oMathParaPr>
+                    <m:oMath xmlns:m="http://schemas.openxmlformats.org/officeDocument/2006/math">
+                      <m:r>
+                        <a:rPr lang="en-US" sz="1200" b="0" i="1" dirty="0" smtClean="0">
+                          <a:latin typeface="Cambria Math" panose="02040503050406030204" pitchFamily="18" charset="0"/>
+                        </a:rPr>
+                        <m:t>$179,586.16</m:t>
+                      </m:r>
+                    </m:oMath>
+                  </m:oMathPara>
+                </a14:m>
+                <a:endParaRPr lang="en-US" sz="1200" dirty="0"/>
+              </a:p>
+            </p:txBody>
+          </p:sp>
+        </mc:Choice>
+        <mc:Fallback xmlns="">
+          <p:sp>
+            <p:nvSpPr>
+              <p:cNvPr id="25" name="TextBox 24">
+                <a:extLst>
+                  <a:ext uri="{FF2B5EF4-FFF2-40B4-BE49-F238E27FC236}">
+                    <a16:creationId xmlns:a16="http://schemas.microsoft.com/office/drawing/2014/main" id="{F49BC8A8-76FB-6D18-898D-63C9D8EBD793}"/>
+                  </a:ext>
+                </a:extLst>
+              </p:cNvPr>
+              <p:cNvSpPr txBox="1">
+                <a:spLocks noRot="1" noChangeAspect="1" noMove="1" noResize="1" noEditPoints="1" noAdjustHandles="1" noChangeArrowheads="1" noChangeShapeType="1" noTextEdit="1"/>
+              </p:cNvSpPr>
+              <p:nvPr/>
+            </p:nvSpPr>
+            <p:spPr>
+              <a:xfrm>
+                <a:off x="3205828" y="3520677"/>
+                <a:ext cx="1050288" cy="276999"/>
+              </a:xfrm>
+              <a:prstGeom prst="rect">
+                <a:avLst/>
+              </a:prstGeom>
+              <a:blipFill>
+                <a:blip r:embed="rId12"/>
+                <a:stretch>
+                  <a:fillRect/>
+                </a:stretch>
+              </a:blipFill>
+            </p:spPr>
+            <p:txBody>
+              <a:bodyPr/>
+              <a:lstStyle/>
+              <a:p>
+                <a:r>
+                  <a:rPr lang="en-US">
+                    <a:noFill/>
+                  </a:rPr>
+                  <a:t> </a:t>
+                </a:r>
+              </a:p>
+            </p:txBody>
+          </p:sp>
+        </mc:Fallback>
+      </mc:AlternateContent>
+      <mc:AlternateContent xmlns:mc="http://schemas.openxmlformats.org/markup-compatibility/2006" xmlns:a14="http://schemas.microsoft.com/office/drawing/2010/main">
+        <mc:Choice Requires="a14">
+          <p:sp>
+            <p:nvSpPr>
+              <p:cNvPr id="26" name="TextBox 25">
+                <a:extLst>
+                  <a:ext uri="{FF2B5EF4-FFF2-40B4-BE49-F238E27FC236}">
+                    <a16:creationId xmlns:a16="http://schemas.microsoft.com/office/drawing/2014/main" id="{2B8F90B2-545D-40E3-58E5-B6D944513051}"/>
+                  </a:ext>
+                </a:extLst>
+              </p:cNvPr>
+              <p:cNvSpPr txBox="1"/>
+              <p:nvPr/>
+            </p:nvSpPr>
+            <p:spPr>
+              <a:xfrm>
+                <a:off x="3205828" y="4163785"/>
+                <a:ext cx="1050288" cy="276999"/>
+              </a:xfrm>
+              <a:prstGeom prst="rect">
+                <a:avLst/>
+              </a:prstGeom>
+              <a:noFill/>
+            </p:spPr>
+            <p:txBody>
+              <a:bodyPr wrap="none" rtlCol="0">
+                <a:spAutoFit/>
+              </a:bodyPr>
+              <a:lstStyle/>
+              <a:p>
+                <a:pPr/>
+                <a14:m>
+                  <m:oMathPara xmlns:m="http://schemas.openxmlformats.org/officeDocument/2006/math">
+                    <m:oMathParaPr>
+                      <m:jc m:val="centerGroup"/>
+                    </m:oMathParaPr>
+                    <m:oMath xmlns:m="http://schemas.openxmlformats.org/officeDocument/2006/math">
+                      <m:r>
+                        <a:rPr lang="en-US" sz="1200" b="0" i="1" dirty="0" smtClean="0">
+                          <a:latin typeface="Cambria Math" panose="02040503050406030204" pitchFamily="18" charset="0"/>
+                        </a:rPr>
+                        <m:t>$179,377.88</m:t>
+                      </m:r>
+                    </m:oMath>
+                  </m:oMathPara>
+                </a14:m>
+                <a:endParaRPr lang="en-US" sz="1200" dirty="0"/>
+              </a:p>
+            </p:txBody>
+          </p:sp>
+        </mc:Choice>
+        <mc:Fallback xmlns="">
+          <p:sp>
+            <p:nvSpPr>
+              <p:cNvPr id="26" name="TextBox 25">
+                <a:extLst>
+                  <a:ext uri="{FF2B5EF4-FFF2-40B4-BE49-F238E27FC236}">
+                    <a16:creationId xmlns:a16="http://schemas.microsoft.com/office/drawing/2014/main" id="{2B8F90B2-545D-40E3-58E5-B6D944513051}"/>
+                  </a:ext>
+                </a:extLst>
+              </p:cNvPr>
+              <p:cNvSpPr txBox="1">
+                <a:spLocks noRot="1" noChangeAspect="1" noMove="1" noResize="1" noEditPoints="1" noAdjustHandles="1" noChangeArrowheads="1" noChangeShapeType="1" noTextEdit="1"/>
+              </p:cNvSpPr>
+              <p:nvPr/>
+            </p:nvSpPr>
+            <p:spPr>
+              <a:xfrm>
+                <a:off x="3205828" y="4163785"/>
+                <a:ext cx="1050288" cy="276999"/>
+              </a:xfrm>
+              <a:prstGeom prst="rect">
+                <a:avLst/>
+              </a:prstGeom>
+              <a:blipFill>
+                <a:blip r:embed="rId13"/>
+                <a:stretch>
+                  <a:fillRect/>
                 </a:stretch>
               </a:blipFill>
             </p:spPr>
@@ -15448,7 +16937,7 @@
                                           </p:stCondLst>
                                         </p:cTn>
                                         <p:tgtEl>
-                                          <p:spTgt spid="6"/>
+                                          <p:spTgt spid="11"/>
                                         </p:tgtEl>
                                         <p:attrNameLst>
                                           <p:attrName>style.visibility</p:attrName>
@@ -15493,7 +16982,7 @@
                                           </p:stCondLst>
                                         </p:cTn>
                                         <p:tgtEl>
-                                          <p:spTgt spid="5"/>
+                                          <p:spTgt spid="12"/>
                                         </p:tgtEl>
                                         <p:attrNameLst>
                                           <p:attrName>style.visibility</p:attrName>
@@ -15525,7 +17014,7 @@
                             </p:stCondLst>
                             <p:childTnLst>
                               <p:par>
-                                <p:cTn id="13" presetID="1" presetClass="entr" presetSubtype="0" fill="hold" nodeType="clickEffect">
+                                <p:cTn id="13" presetID="1" presetClass="entr" presetSubtype="0" fill="hold" grpId="0" nodeType="clickEffect">
                                   <p:stCondLst>
                                     <p:cond delay="0"/>
                                   </p:stCondLst>
@@ -15538,11 +17027,7 @@
                                           </p:stCondLst>
                                         </p:cTn>
                                         <p:tgtEl>
-                                          <p:spTgt spid="7">
-                                            <p:txEl>
-                                              <p:pRg st="0" end="0"/>
-                                            </p:txEl>
-                                          </p:spTgt>
+                                          <p:spTgt spid="13"/>
                                         </p:tgtEl>
                                         <p:attrNameLst>
                                           <p:attrName>style.visibility</p:attrName>
@@ -15574,7 +17059,7 @@
                             </p:stCondLst>
                             <p:childTnLst>
                               <p:par>
-                                <p:cTn id="17" presetID="1" presetClass="entr" presetSubtype="0" fill="hold" nodeType="clickEffect">
+                                <p:cTn id="17" presetID="1" presetClass="entr" presetSubtype="0" fill="hold" grpId="0" nodeType="clickEffect">
                                   <p:stCondLst>
                                     <p:cond delay="0"/>
                                   </p:stCondLst>
@@ -15587,11 +17072,241 @@
                                           </p:stCondLst>
                                         </p:cTn>
                                         <p:tgtEl>
-                                          <p:spTgt spid="8">
-                                            <p:txEl>
-                                              <p:pRg st="0" end="0"/>
-                                            </p:txEl>
-                                          </p:spTgt>
+                                          <p:spTgt spid="14"/>
+                                        </p:tgtEl>
+                                        <p:attrNameLst>
+                                          <p:attrName>style.visibility</p:attrName>
+                                        </p:attrNameLst>
+                                      </p:cBhvr>
+                                      <p:to>
+                                        <p:strVal val="visible"/>
+                                      </p:to>
+                                    </p:set>
+                                  </p:childTnLst>
+                                </p:cTn>
+                              </p:par>
+                            </p:childTnLst>
+                          </p:cTn>
+                        </p:par>
+                      </p:childTnLst>
+                    </p:cTn>
+                  </p:par>
+                  <p:par>
+                    <p:cTn id="19" fill="hold">
+                      <p:stCondLst>
+                        <p:cond delay="indefinite"/>
+                      </p:stCondLst>
+                      <p:childTnLst>
+                        <p:par>
+                          <p:cTn id="20" fill="hold">
+                            <p:stCondLst>
+                              <p:cond delay="0"/>
+                            </p:stCondLst>
+                            <p:childTnLst>
+                              <p:par>
+                                <p:cTn id="21" presetID="1" presetClass="entr" presetSubtype="0" fill="hold" grpId="0" nodeType="clickEffect">
+                                  <p:stCondLst>
+                                    <p:cond delay="0"/>
+                                  </p:stCondLst>
+                                  <p:childTnLst>
+                                    <p:set>
+                                      <p:cBhvr>
+                                        <p:cTn id="22" dur="1" fill="hold">
+                                          <p:stCondLst>
+                                            <p:cond delay="0"/>
+                                          </p:stCondLst>
+                                        </p:cTn>
+                                        <p:tgtEl>
+                                          <p:spTgt spid="15"/>
+                                        </p:tgtEl>
+                                        <p:attrNameLst>
+                                          <p:attrName>style.visibility</p:attrName>
+                                        </p:attrNameLst>
+                                      </p:cBhvr>
+                                      <p:to>
+                                        <p:strVal val="visible"/>
+                                      </p:to>
+                                    </p:set>
+                                  </p:childTnLst>
+                                </p:cTn>
+                              </p:par>
+                            </p:childTnLst>
+                          </p:cTn>
+                        </p:par>
+                      </p:childTnLst>
+                    </p:cTn>
+                  </p:par>
+                  <p:par>
+                    <p:cTn id="23" fill="hold">
+                      <p:stCondLst>
+                        <p:cond delay="indefinite"/>
+                      </p:stCondLst>
+                      <p:childTnLst>
+                        <p:par>
+                          <p:cTn id="24" fill="hold">
+                            <p:stCondLst>
+                              <p:cond delay="0"/>
+                            </p:stCondLst>
+                            <p:childTnLst>
+                              <p:par>
+                                <p:cTn id="25" presetID="1" presetClass="entr" presetSubtype="0" fill="hold" grpId="0" nodeType="clickEffect">
+                                  <p:stCondLst>
+                                    <p:cond delay="0"/>
+                                  </p:stCondLst>
+                                  <p:childTnLst>
+                                    <p:set>
+                                      <p:cBhvr>
+                                        <p:cTn id="26" dur="1" fill="hold">
+                                          <p:stCondLst>
+                                            <p:cond delay="0"/>
+                                          </p:stCondLst>
+                                        </p:cTn>
+                                        <p:tgtEl>
+                                          <p:spTgt spid="22"/>
+                                        </p:tgtEl>
+                                        <p:attrNameLst>
+                                          <p:attrName>style.visibility</p:attrName>
+                                        </p:attrNameLst>
+                                      </p:cBhvr>
+                                      <p:to>
+                                        <p:strVal val="visible"/>
+                                      </p:to>
+                                    </p:set>
+                                  </p:childTnLst>
+                                </p:cTn>
+                              </p:par>
+                            </p:childTnLst>
+                          </p:cTn>
+                        </p:par>
+                      </p:childTnLst>
+                    </p:cTn>
+                  </p:par>
+                  <p:par>
+                    <p:cTn id="27" fill="hold">
+                      <p:stCondLst>
+                        <p:cond delay="indefinite"/>
+                      </p:stCondLst>
+                      <p:childTnLst>
+                        <p:par>
+                          <p:cTn id="28" fill="hold">
+                            <p:stCondLst>
+                              <p:cond delay="0"/>
+                            </p:stCondLst>
+                            <p:childTnLst>
+                              <p:par>
+                                <p:cTn id="29" presetID="1" presetClass="entr" presetSubtype="0" fill="hold" grpId="0" nodeType="clickEffect">
+                                  <p:stCondLst>
+                                    <p:cond delay="0"/>
+                                  </p:stCondLst>
+                                  <p:childTnLst>
+                                    <p:set>
+                                      <p:cBhvr>
+                                        <p:cTn id="30" dur="1" fill="hold">
+                                          <p:stCondLst>
+                                            <p:cond delay="0"/>
+                                          </p:stCondLst>
+                                        </p:cTn>
+                                        <p:tgtEl>
+                                          <p:spTgt spid="23"/>
+                                        </p:tgtEl>
+                                        <p:attrNameLst>
+                                          <p:attrName>style.visibility</p:attrName>
+                                        </p:attrNameLst>
+                                      </p:cBhvr>
+                                      <p:to>
+                                        <p:strVal val="visible"/>
+                                      </p:to>
+                                    </p:set>
+                                  </p:childTnLst>
+                                </p:cTn>
+                              </p:par>
+                            </p:childTnLst>
+                          </p:cTn>
+                        </p:par>
+                      </p:childTnLst>
+                    </p:cTn>
+                  </p:par>
+                  <p:par>
+                    <p:cTn id="31" fill="hold">
+                      <p:stCondLst>
+                        <p:cond delay="indefinite"/>
+                      </p:stCondLst>
+                      <p:childTnLst>
+                        <p:par>
+                          <p:cTn id="32" fill="hold">
+                            <p:stCondLst>
+                              <p:cond delay="0"/>
+                            </p:stCondLst>
+                            <p:childTnLst>
+                              <p:par>
+                                <p:cTn id="33" presetID="1" presetClass="entr" presetSubtype="0" fill="hold" grpId="0" nodeType="clickEffect">
+                                  <p:stCondLst>
+                                    <p:cond delay="0"/>
+                                  </p:stCondLst>
+                                  <p:childTnLst>
+                                    <p:set>
+                                      <p:cBhvr>
+                                        <p:cTn id="34" dur="1" fill="hold">
+                                          <p:stCondLst>
+                                            <p:cond delay="0"/>
+                                          </p:stCondLst>
+                                        </p:cTn>
+                                        <p:tgtEl>
+                                          <p:spTgt spid="24"/>
+                                        </p:tgtEl>
+                                        <p:attrNameLst>
+                                          <p:attrName>style.visibility</p:attrName>
+                                        </p:attrNameLst>
+                                      </p:cBhvr>
+                                      <p:to>
+                                        <p:strVal val="visible"/>
+                                      </p:to>
+                                    </p:set>
+                                  </p:childTnLst>
+                                </p:cTn>
+                              </p:par>
+                              <p:par>
+                                <p:cTn id="35" presetID="1" presetClass="entr" presetSubtype="0" fill="hold" grpId="0" nodeType="withEffect">
+                                  <p:stCondLst>
+                                    <p:cond delay="0"/>
+                                  </p:stCondLst>
+                                  <p:childTnLst>
+                                    <p:set>
+                                      <p:cBhvr>
+                                        <p:cTn id="36" dur="1" fill="hold">
+                                          <p:stCondLst>
+                                            <p:cond delay="0"/>
+                                          </p:stCondLst>
+                                        </p:cTn>
+                                        <p:tgtEl>
+                                          <p:spTgt spid="25"/>
+                                        </p:tgtEl>
+                                        <p:attrNameLst>
+                                          <p:attrName>style.visibility</p:attrName>
+                                        </p:attrNameLst>
+                                      </p:cBhvr>
+                                      <p:to>
+                                        <p:strVal val="visible"/>
+                                      </p:to>
+                                    </p:set>
+                                  </p:childTnLst>
+                                </p:cTn>
+                              </p:par>
+                              <p:par>
+                                <p:cTn id="37" presetID="1" presetClass="entr" presetSubtype="0" fill="hold" grpId="0" nodeType="withEffect">
+                                  <p:stCondLst>
+                                    <p:cond delay="0"/>
+                                  </p:stCondLst>
+                                  <p:childTnLst>
+                                    <p:set>
+                                      <p:cBhvr>
+                                        <p:cTn id="38" dur="1" fill="hold">
+                                          <p:stCondLst>
+                                            <p:cond delay="0"/>
+                                          </p:stCondLst>
+                                        </p:cTn>
+                                        <p:tgtEl>
+                                          <p:spTgt spid="26"/>
                                         </p:tgtEl>
                                         <p:attrNameLst>
                                           <p:attrName>style.visibility</p:attrName>
@@ -15632,8 +17347,16 @@
       </p:par>
     </p:tnLst>
     <p:bldLst>
-      <p:bldP spid="5" grpId="0"/>
-      <p:bldP spid="6" grpId="0"/>
+      <p:bldP spid="11" grpId="0"/>
+      <p:bldP spid="12" grpId="0"/>
+      <p:bldP spid="13" grpId="0"/>
+      <p:bldP spid="14" grpId="0"/>
+      <p:bldP spid="15" grpId="0"/>
+      <p:bldP spid="22" grpId="0"/>
+      <p:bldP spid="23" grpId="0"/>
+      <p:bldP spid="24" grpId="0"/>
+      <p:bldP spid="25" grpId="0"/>
+      <p:bldP spid="26" grpId="0"/>
     </p:bldLst>
   </p:timing>
 </p:sld>
@@ -16382,6 +18105,51 @@
                       </p:childTnLst>
                     </p:cTn>
                   </p:par>
+                  <p:par>
+                    <p:cTn id="8" fill="hold">
+                      <p:stCondLst>
+                        <p:cond delay="indefinite"/>
+                      </p:stCondLst>
+                      <p:childTnLst>
+                        <p:par>
+                          <p:cTn id="9" fill="hold">
+                            <p:stCondLst>
+                              <p:cond delay="0"/>
+                            </p:stCondLst>
+                            <p:childTnLst>
+                              <p:par>
+                                <p:cTn id="10" presetID="1" presetClass="entr" presetSubtype="0" fill="hold" grpId="1" nodeType="clickEffect">
+                                  <p:stCondLst>
+                                    <p:cond delay="0"/>
+                                  </p:stCondLst>
+                                  <p:childTnLst>
+                                    <p:set>
+                                      <p:cBhvr>
+                                        <p:cTn id="11" dur="1" fill="hold">
+                                          <p:stCondLst>
+                                            <p:cond delay="0"/>
+                                          </p:stCondLst>
+                                        </p:cTn>
+                                        <p:tgtEl>
+                                          <p:spTgt spid="11"/>
+                                        </p:tgtEl>
+                                        <p:attrNameLst>
+                                          <p:attrName>style.visibility</p:attrName>
+                                        </p:attrNameLst>
+                                      </p:cBhvr>
+                                      <p:to>
+                                        <p:strVal val="visible"/>
+                                      </p:to>
+                                    </p:set>
+                                  </p:childTnLst>
+                                </p:cTn>
+                              </p:par>
+                            </p:childTnLst>
+                          </p:cTn>
+                        </p:par>
+                      </p:childTnLst>
+                    </p:cTn>
+                  </p:par>
                 </p:childTnLst>
               </p:cTn>
               <p:prevCondLst>
@@ -16405,6 +18173,7 @@
     </p:tnLst>
     <p:bldLst>
       <p:bldP spid="11" grpId="0" animBg="1"/>
+      <p:bldP spid="11" grpId="1" animBg="1"/>
     </p:bldLst>
   </p:timing>
 </p:sld>
@@ -16980,6 +18749,51 @@
                       </p:childTnLst>
                     </p:cTn>
                   </p:par>
+                  <p:par>
+                    <p:cTn id="8" fill="hold">
+                      <p:stCondLst>
+                        <p:cond delay="indefinite"/>
+                      </p:stCondLst>
+                      <p:childTnLst>
+                        <p:par>
+                          <p:cTn id="9" fill="hold">
+                            <p:stCondLst>
+                              <p:cond delay="0"/>
+                            </p:stCondLst>
+                            <p:childTnLst>
+                              <p:par>
+                                <p:cTn id="10" presetID="1" presetClass="entr" presetSubtype="0" fill="hold" grpId="1" nodeType="clickEffect">
+                                  <p:stCondLst>
+                                    <p:cond delay="0"/>
+                                  </p:stCondLst>
+                                  <p:childTnLst>
+                                    <p:set>
+                                      <p:cBhvr>
+                                        <p:cTn id="11" dur="1" fill="hold">
+                                          <p:stCondLst>
+                                            <p:cond delay="0"/>
+                                          </p:stCondLst>
+                                        </p:cTn>
+                                        <p:tgtEl>
+                                          <p:spTgt spid="11"/>
+                                        </p:tgtEl>
+                                        <p:attrNameLst>
+                                          <p:attrName>style.visibility</p:attrName>
+                                        </p:attrNameLst>
+                                      </p:cBhvr>
+                                      <p:to>
+                                        <p:strVal val="visible"/>
+                                      </p:to>
+                                    </p:set>
+                                  </p:childTnLst>
+                                </p:cTn>
+                              </p:par>
+                            </p:childTnLst>
+                          </p:cTn>
+                        </p:par>
+                      </p:childTnLst>
+                    </p:cTn>
+                  </p:par>
                 </p:childTnLst>
               </p:cTn>
               <p:prevCondLst>
@@ -17003,6 +18817,7 @@
     </p:tnLst>
     <p:bldLst>
       <p:bldP spid="11" grpId="0" animBg="1"/>
+      <p:bldP spid="11" grpId="1" animBg="1"/>
     </p:bldLst>
   </p:timing>
 </p:sld>
@@ -17375,7 +19190,30 @@
                 <a:cs typeface="Roboto Condensed"/>
                 <a:sym typeface="Roboto Condensed"/>
               </a:rPr>
-              <a:t>Mortgages</a:t>
+              <a:t>Amortization</a:t>
+            </a:r>
+          </a:p>
+          <a:p>
+            <a:pPr marL="0" lvl="0" indent="0" algn="ctr" rtl="0">
+              <a:spcBef>
+                <a:spcPts val="0"/>
+              </a:spcBef>
+              <a:spcAft>
+                <a:spcPts val="0"/>
+              </a:spcAft>
+              <a:buNone/>
+            </a:pPr>
+            <a:r>
+              <a:rPr lang="en" dirty="0">
+                <a:solidFill>
+                  <a:schemeClr val="dk2"/>
+                </a:solidFill>
+                <a:latin typeface="Roboto Condensed"/>
+                <a:ea typeface="Roboto Condensed"/>
+                <a:cs typeface="Roboto Condensed"/>
+                <a:sym typeface="Roboto Condensed"/>
+              </a:rPr>
+              <a:t>Schedules</a:t>
             </a:r>
             <a:endParaRPr dirty="0">
               <a:solidFill>
@@ -19615,8 +21453,8 @@
           </a:p>
         </p:txBody>
       </p:sp>
-      <mc:AlternateContent xmlns:mc="http://schemas.openxmlformats.org/markup-compatibility/2006">
-        <mc:Choice xmlns:a14="http://schemas.microsoft.com/office/drawing/2010/main" Requires="a14">
+      <mc:AlternateContent xmlns:mc="http://schemas.openxmlformats.org/markup-compatibility/2006" xmlns:a14="http://schemas.microsoft.com/office/drawing/2010/main">
+        <mc:Choice Requires="a14">
           <p:sp>
             <p:nvSpPr>
               <p:cNvPr id="2" name="Text Placeholder 1">
@@ -19881,7 +21719,7 @@
             </p:txBody>
           </p:sp>
         </mc:Choice>
-        <mc:Fallback>
+        <mc:Fallback xmlns="">
           <p:sp>
             <p:nvSpPr>
               <p:cNvPr id="2" name="Text Placeholder 1">
@@ -26895,7 +28733,7 @@
             </a:pPr>
             <a:r>
               <a:rPr lang="en" dirty="0"/>
-              <a:t>Mortgages</a:t>
+              <a:t>Amortization Schedules</a:t>
             </a:r>
             <a:endParaRPr dirty="0"/>
           </a:p>

</xml_diff>